<commit_message>
Draws formations to Scout Cards
</commit_message>
<xml_diff>
--- a/default_templates.pptx
+++ b/default_templates.pptx
@@ -6,8 +6,10 @@
   </p:sldMasterIdLst>
   <p:sldIdLst>
     <p:sldId id="274" r:id="rId2"/>
-    <p:sldId id="275" r:id="rId3"/>
-    <p:sldId id="277" r:id="rId4"/>
+    <p:sldId id="278" r:id="rId3"/>
+    <p:sldId id="279" r:id="rId4"/>
+    <p:sldId id="275" r:id="rId5"/>
+    <p:sldId id="277" r:id="rId6"/>
   </p:sldIdLst>
   <p:sldSz cx="9144000" cy="6858000" type="screen4x3"/>
   <p:notesSz cx="6858000" cy="9144000"/>
@@ -245,7 +247,7 @@
           <a:p>
             <a:fld id="{17226708-12E5-46C2-9039-F0433A84E3BE}" type="datetimeFigureOut">
               <a:rPr lang="en-US" smtClean="0"/>
-              <a:t>4/19/2018</a:t>
+              <a:t>4/20/2018</a:t>
             </a:fld>
             <a:endParaRPr lang="en-US"/>
           </a:p>
@@ -415,7 +417,7 @@
           <a:p>
             <a:fld id="{17226708-12E5-46C2-9039-F0433A84E3BE}" type="datetimeFigureOut">
               <a:rPr lang="en-US" smtClean="0"/>
-              <a:t>4/19/2018</a:t>
+              <a:t>4/20/2018</a:t>
             </a:fld>
             <a:endParaRPr lang="en-US"/>
           </a:p>
@@ -595,7 +597,7 @@
           <a:p>
             <a:fld id="{17226708-12E5-46C2-9039-F0433A84E3BE}" type="datetimeFigureOut">
               <a:rPr lang="en-US" smtClean="0"/>
-              <a:t>4/19/2018</a:t>
+              <a:t>4/20/2018</a:t>
             </a:fld>
             <a:endParaRPr lang="en-US"/>
           </a:p>
@@ -765,7 +767,7 @@
           <a:p>
             <a:fld id="{17226708-12E5-46C2-9039-F0433A84E3BE}" type="datetimeFigureOut">
               <a:rPr lang="en-US" smtClean="0"/>
-              <a:t>4/19/2018</a:t>
+              <a:t>4/20/2018</a:t>
             </a:fld>
             <a:endParaRPr lang="en-US"/>
           </a:p>
@@ -1009,7 +1011,7 @@
           <a:p>
             <a:fld id="{17226708-12E5-46C2-9039-F0433A84E3BE}" type="datetimeFigureOut">
               <a:rPr lang="en-US" smtClean="0"/>
-              <a:t>4/19/2018</a:t>
+              <a:t>4/20/2018</a:t>
             </a:fld>
             <a:endParaRPr lang="en-US"/>
           </a:p>
@@ -1241,7 +1243,7 @@
           <a:p>
             <a:fld id="{17226708-12E5-46C2-9039-F0433A84E3BE}" type="datetimeFigureOut">
               <a:rPr lang="en-US" smtClean="0"/>
-              <a:t>4/19/2018</a:t>
+              <a:t>4/20/2018</a:t>
             </a:fld>
             <a:endParaRPr lang="en-US"/>
           </a:p>
@@ -1608,7 +1610,7 @@
           <a:p>
             <a:fld id="{17226708-12E5-46C2-9039-F0433A84E3BE}" type="datetimeFigureOut">
               <a:rPr lang="en-US" smtClean="0"/>
-              <a:t>4/19/2018</a:t>
+              <a:t>4/20/2018</a:t>
             </a:fld>
             <a:endParaRPr lang="en-US"/>
           </a:p>
@@ -1726,7 +1728,7 @@
           <a:p>
             <a:fld id="{17226708-12E5-46C2-9039-F0433A84E3BE}" type="datetimeFigureOut">
               <a:rPr lang="en-US" smtClean="0"/>
-              <a:t>4/19/2018</a:t>
+              <a:t>4/20/2018</a:t>
             </a:fld>
             <a:endParaRPr lang="en-US"/>
           </a:p>
@@ -1821,7 +1823,7 @@
           <a:p>
             <a:fld id="{17226708-12E5-46C2-9039-F0433A84E3BE}" type="datetimeFigureOut">
               <a:rPr lang="en-US" smtClean="0"/>
-              <a:t>4/19/2018</a:t>
+              <a:t>4/20/2018</a:t>
             </a:fld>
             <a:endParaRPr lang="en-US"/>
           </a:p>
@@ -2098,7 +2100,7 @@
           <a:p>
             <a:fld id="{17226708-12E5-46C2-9039-F0433A84E3BE}" type="datetimeFigureOut">
               <a:rPr lang="en-US" smtClean="0"/>
-              <a:t>4/19/2018</a:t>
+              <a:t>4/20/2018</a:t>
             </a:fld>
             <a:endParaRPr lang="en-US"/>
           </a:p>
@@ -2355,7 +2357,7 @@
           <a:p>
             <a:fld id="{17226708-12E5-46C2-9039-F0433A84E3BE}" type="datetimeFigureOut">
               <a:rPr lang="en-US" smtClean="0"/>
-              <a:t>4/19/2018</a:t>
+              <a:t>4/20/2018</a:t>
             </a:fld>
             <a:endParaRPr lang="en-US"/>
           </a:p>
@@ -2568,7 +2570,7 @@
           <a:p>
             <a:fld id="{17226708-12E5-46C2-9039-F0433A84E3BE}" type="datetimeFigureOut">
               <a:rPr lang="en-US" smtClean="0"/>
-              <a:t>4/19/2018</a:t>
+              <a:t>4/20/2018</a:t>
             </a:fld>
             <a:endParaRPr lang="en-US"/>
           </a:p>
@@ -2973,36 +2975,6 @@
           <a:chExt cx="0" cy="0"/>
         </a:xfrm>
       </p:grpSpPr>
-      <p:pic>
-        <p:nvPicPr>
-          <p:cNvPr id="53" name="Picture 52">
-            <a:extLst>
-              <a:ext uri="{FF2B5EF4-FFF2-40B4-BE49-F238E27FC236}">
-                <a16:creationId xmlns:a16="http://schemas.microsoft.com/office/drawing/2014/main" id="{7DA85D94-D37F-48F1-BC2C-59DBFC9300A8}"/>
-              </a:ext>
-            </a:extLst>
-          </p:cNvPr>
-          <p:cNvPicPr>
-            <a:picLocks noChangeAspect="1"/>
-          </p:cNvPicPr>
-          <p:nvPr/>
-        </p:nvPicPr>
-        <p:blipFill>
-          <a:blip r:embed="rId2"/>
-          <a:stretch>
-            <a:fillRect/>
-          </a:stretch>
-        </p:blipFill>
-        <p:spPr>
-          <a:xfrm>
-            <a:off x="34692" y="2455233"/>
-            <a:ext cx="9074616" cy="3860998"/>
-          </a:xfrm>
-          <a:prstGeom prst="rect">
-            <a:avLst/>
-          </a:prstGeom>
-        </p:spPr>
-      </p:pic>
       <p:sp>
         <p:nvSpPr>
           <p:cNvPr id="23" name="Rectangle 22">
@@ -3258,196 +3230,6 @@
           </a:p>
         </p:txBody>
       </p:sp>
-      <p:cxnSp>
-        <p:nvCxnSpPr>
-          <p:cNvPr id="18" name="Straight Connector 17">
-            <a:extLst>
-              <a:ext uri="{FF2B5EF4-FFF2-40B4-BE49-F238E27FC236}">
-                <a16:creationId xmlns:a16="http://schemas.microsoft.com/office/drawing/2014/main" id="{15EC7B01-C95D-446B-86CF-863B18F5AB5B}"/>
-              </a:ext>
-            </a:extLst>
-          </p:cNvPr>
-          <p:cNvCxnSpPr>
-            <a:cxnSpLocks/>
-          </p:cNvCxnSpPr>
-          <p:nvPr/>
-        </p:nvCxnSpPr>
-        <p:spPr>
-          <a:xfrm flipH="1">
-            <a:off x="159595" y="1308102"/>
-            <a:ext cx="8637972" cy="0"/>
-          </a:xfrm>
-          <a:prstGeom prst="line">
-            <a:avLst/>
-          </a:prstGeom>
-        </p:spPr>
-        <p:style>
-          <a:lnRef idx="1">
-            <a:schemeClr val="accent1"/>
-          </a:lnRef>
-          <a:fillRef idx="0">
-            <a:schemeClr val="accent1"/>
-          </a:fillRef>
-          <a:effectRef idx="0">
-            <a:schemeClr val="accent1"/>
-          </a:effectRef>
-          <a:fontRef idx="minor">
-            <a:schemeClr val="tx1"/>
-          </a:fontRef>
-        </p:style>
-      </p:cxnSp>
-      <p:cxnSp>
-        <p:nvCxnSpPr>
-          <p:cNvPr id="20" name="Straight Connector 19">
-            <a:extLst>
-              <a:ext uri="{FF2B5EF4-FFF2-40B4-BE49-F238E27FC236}">
-                <a16:creationId xmlns:a16="http://schemas.microsoft.com/office/drawing/2014/main" id="{80EB5DBF-9C15-40E6-9C65-ABE5FDFD472A}"/>
-              </a:ext>
-            </a:extLst>
-          </p:cNvPr>
-          <p:cNvCxnSpPr>
-            <a:cxnSpLocks/>
-          </p:cNvCxnSpPr>
-          <p:nvPr/>
-        </p:nvCxnSpPr>
-        <p:spPr>
-          <a:xfrm flipH="1">
-            <a:off x="159595" y="1753326"/>
-            <a:ext cx="8637972" cy="0"/>
-          </a:xfrm>
-          <a:prstGeom prst="line">
-            <a:avLst/>
-          </a:prstGeom>
-        </p:spPr>
-        <p:style>
-          <a:lnRef idx="1">
-            <a:schemeClr val="accent1"/>
-          </a:lnRef>
-          <a:fillRef idx="0">
-            <a:schemeClr val="accent1"/>
-          </a:fillRef>
-          <a:effectRef idx="0">
-            <a:schemeClr val="accent1"/>
-          </a:effectRef>
-          <a:fontRef idx="minor">
-            <a:schemeClr val="tx1"/>
-          </a:fontRef>
-        </p:style>
-      </p:cxnSp>
-      <p:cxnSp>
-        <p:nvCxnSpPr>
-          <p:cNvPr id="21" name="Straight Connector 20">
-            <a:extLst>
-              <a:ext uri="{FF2B5EF4-FFF2-40B4-BE49-F238E27FC236}">
-                <a16:creationId xmlns:a16="http://schemas.microsoft.com/office/drawing/2014/main" id="{50C5EE44-85F4-44D0-9DFA-7AE59239EAD0}"/>
-              </a:ext>
-            </a:extLst>
-          </p:cNvPr>
-          <p:cNvCxnSpPr>
-            <a:cxnSpLocks/>
-          </p:cNvCxnSpPr>
-          <p:nvPr/>
-        </p:nvCxnSpPr>
-        <p:spPr>
-          <a:xfrm>
-            <a:off x="5207830" y="1029317"/>
-            <a:ext cx="0" cy="2000821"/>
-          </a:xfrm>
-          <a:prstGeom prst="line">
-            <a:avLst/>
-          </a:prstGeom>
-        </p:spPr>
-        <p:style>
-          <a:lnRef idx="1">
-            <a:schemeClr val="accent1"/>
-          </a:lnRef>
-          <a:fillRef idx="0">
-            <a:schemeClr val="accent1"/>
-          </a:fillRef>
-          <a:effectRef idx="0">
-            <a:schemeClr val="accent1"/>
-          </a:effectRef>
-          <a:fontRef idx="minor">
-            <a:schemeClr val="tx1"/>
-          </a:fontRef>
-        </p:style>
-      </p:cxnSp>
-      <p:cxnSp>
-        <p:nvCxnSpPr>
-          <p:cNvPr id="22" name="Straight Connector 21">
-            <a:extLst>
-              <a:ext uri="{FF2B5EF4-FFF2-40B4-BE49-F238E27FC236}">
-                <a16:creationId xmlns:a16="http://schemas.microsoft.com/office/drawing/2014/main" id="{8FFEA17C-50FF-4426-AE85-F2527EDEBC89}"/>
-              </a:ext>
-            </a:extLst>
-          </p:cNvPr>
-          <p:cNvCxnSpPr>
-            <a:cxnSpLocks/>
-          </p:cNvCxnSpPr>
-          <p:nvPr/>
-        </p:nvCxnSpPr>
-        <p:spPr>
-          <a:xfrm>
-            <a:off x="3909819" y="1048459"/>
-            <a:ext cx="0" cy="2000821"/>
-          </a:xfrm>
-          <a:prstGeom prst="line">
-            <a:avLst/>
-          </a:prstGeom>
-        </p:spPr>
-        <p:style>
-          <a:lnRef idx="1">
-            <a:schemeClr val="accent1"/>
-          </a:lnRef>
-          <a:fillRef idx="0">
-            <a:schemeClr val="accent1"/>
-          </a:fillRef>
-          <a:effectRef idx="0">
-            <a:schemeClr val="accent1"/>
-          </a:effectRef>
-          <a:fontRef idx="minor">
-            <a:schemeClr val="tx1"/>
-          </a:fontRef>
-        </p:style>
-      </p:cxnSp>
-      <p:cxnSp>
-        <p:nvCxnSpPr>
-          <p:cNvPr id="34" name="Straight Connector 33">
-            <a:extLst>
-              <a:ext uri="{FF2B5EF4-FFF2-40B4-BE49-F238E27FC236}">
-                <a16:creationId xmlns:a16="http://schemas.microsoft.com/office/drawing/2014/main" id="{A4971B96-589B-4B65-A9F4-86E72142DC00}"/>
-              </a:ext>
-            </a:extLst>
-          </p:cNvPr>
-          <p:cNvCxnSpPr>
-            <a:cxnSpLocks/>
-          </p:cNvCxnSpPr>
-          <p:nvPr/>
-        </p:nvCxnSpPr>
-        <p:spPr>
-          <a:xfrm flipH="1">
-            <a:off x="159595" y="2218715"/>
-            <a:ext cx="8637972" cy="0"/>
-          </a:xfrm>
-          <a:prstGeom prst="line">
-            <a:avLst/>
-          </a:prstGeom>
-        </p:spPr>
-        <p:style>
-          <a:lnRef idx="1">
-            <a:schemeClr val="accent1"/>
-          </a:lnRef>
-          <a:fillRef idx="0">
-            <a:schemeClr val="accent1"/>
-          </a:fillRef>
-          <a:effectRef idx="0">
-            <a:schemeClr val="accent1"/>
-          </a:effectRef>
-          <a:fontRef idx="minor">
-            <a:schemeClr val="tx1"/>
-          </a:fontRef>
-        </p:style>
-      </p:cxnSp>
       <p:sp>
         <p:nvSpPr>
           <p:cNvPr id="26" name="TextBox 25">
@@ -3463,7 +3245,7 @@
         <p:spPr>
           <a:xfrm>
             <a:off x="228887" y="319512"/>
-            <a:ext cx="2260042" cy="369332"/>
+            <a:ext cx="3036024" cy="369332"/>
           </a:xfrm>
           <a:prstGeom prst="rect">
             <a:avLst/>
@@ -3482,8 +3264,13 @@
             </a:r>
             <a:r>
               <a:rPr lang="en-US" dirty="0"/>
-              <a:t>=Formation</a:t>
-            </a:r>
+              <a:t>=</a:t>
+            </a:r>
+            <a:r>
+              <a:rPr lang="en-US" dirty="0" err="1"/>
+              <a:t>Formation_Players</a:t>
+            </a:r>
+            <a:endParaRPr lang="en-US" dirty="0"/>
           </a:p>
         </p:txBody>
       </p:sp>
@@ -3526,457 +3313,6 @@
           </a:p>
         </p:txBody>
       </p:sp>
-      <p:cxnSp>
-        <p:nvCxnSpPr>
-          <p:cNvPr id="28" name="Straight Connector 27">
-            <a:extLst>
-              <a:ext uri="{FF2B5EF4-FFF2-40B4-BE49-F238E27FC236}">
-                <a16:creationId xmlns:a16="http://schemas.microsoft.com/office/drawing/2014/main" id="{06AAAFFE-740E-4AB6-9B7F-81C6C406FB63}"/>
-              </a:ext>
-            </a:extLst>
-          </p:cNvPr>
-          <p:cNvCxnSpPr/>
-          <p:nvPr/>
-        </p:nvCxnSpPr>
-        <p:spPr>
-          <a:xfrm>
-            <a:off x="1034113" y="1029317"/>
-            <a:ext cx="0" cy="3453413"/>
-          </a:xfrm>
-          <a:prstGeom prst="line">
-            <a:avLst/>
-          </a:prstGeom>
-        </p:spPr>
-        <p:style>
-          <a:lnRef idx="1">
-            <a:schemeClr val="accent1"/>
-          </a:lnRef>
-          <a:fillRef idx="0">
-            <a:schemeClr val="accent1"/>
-          </a:fillRef>
-          <a:effectRef idx="0">
-            <a:schemeClr val="accent1"/>
-          </a:effectRef>
-          <a:fontRef idx="minor">
-            <a:schemeClr val="tx1"/>
-          </a:fontRef>
-        </p:style>
-      </p:cxnSp>
-      <p:cxnSp>
-        <p:nvCxnSpPr>
-          <p:cNvPr id="29" name="Straight Connector 28">
-            <a:extLst>
-              <a:ext uri="{FF2B5EF4-FFF2-40B4-BE49-F238E27FC236}">
-                <a16:creationId xmlns:a16="http://schemas.microsoft.com/office/drawing/2014/main" id="{B93B0CEF-6588-4585-BDC2-FEBBEF8DBA3C}"/>
-              </a:ext>
-            </a:extLst>
-          </p:cNvPr>
-          <p:cNvCxnSpPr/>
-          <p:nvPr/>
-        </p:nvCxnSpPr>
-        <p:spPr>
-          <a:xfrm>
-            <a:off x="8089419" y="1112082"/>
-            <a:ext cx="0" cy="3453413"/>
-          </a:xfrm>
-          <a:prstGeom prst="line">
-            <a:avLst/>
-          </a:prstGeom>
-        </p:spPr>
-        <p:style>
-          <a:lnRef idx="1">
-            <a:schemeClr val="accent1"/>
-          </a:lnRef>
-          <a:fillRef idx="0">
-            <a:schemeClr val="accent1"/>
-          </a:fillRef>
-          <a:effectRef idx="0">
-            <a:schemeClr val="accent1"/>
-          </a:effectRef>
-          <a:fontRef idx="minor">
-            <a:schemeClr val="tx1"/>
-          </a:fontRef>
-        </p:style>
-      </p:cxnSp>
-      <p:cxnSp>
-        <p:nvCxnSpPr>
-          <p:cNvPr id="30" name="Straight Connector 29">
-            <a:extLst>
-              <a:ext uri="{FF2B5EF4-FFF2-40B4-BE49-F238E27FC236}">
-                <a16:creationId xmlns:a16="http://schemas.microsoft.com/office/drawing/2014/main" id="{DAE7B122-E63E-4553-A63E-6B43EC77728D}"/>
-              </a:ext>
-            </a:extLst>
-          </p:cNvPr>
-          <p:cNvCxnSpPr/>
-          <p:nvPr/>
-        </p:nvCxnSpPr>
-        <p:spPr>
-          <a:xfrm>
-            <a:off x="2659516" y="1061128"/>
-            <a:ext cx="0" cy="3453413"/>
-          </a:xfrm>
-          <a:prstGeom prst="line">
-            <a:avLst/>
-          </a:prstGeom>
-        </p:spPr>
-        <p:style>
-          <a:lnRef idx="1">
-            <a:schemeClr val="accent1"/>
-          </a:lnRef>
-          <a:fillRef idx="0">
-            <a:schemeClr val="accent1"/>
-          </a:fillRef>
-          <a:effectRef idx="0">
-            <a:schemeClr val="accent1"/>
-          </a:effectRef>
-          <a:fontRef idx="minor">
-            <a:schemeClr val="tx1"/>
-          </a:fontRef>
-        </p:style>
-      </p:cxnSp>
-      <p:cxnSp>
-        <p:nvCxnSpPr>
-          <p:cNvPr id="35" name="Straight Connector 34">
-            <a:extLst>
-              <a:ext uri="{FF2B5EF4-FFF2-40B4-BE49-F238E27FC236}">
-                <a16:creationId xmlns:a16="http://schemas.microsoft.com/office/drawing/2014/main" id="{DA4CA6BB-FAB2-443C-AE1E-DACB6A26C273}"/>
-              </a:ext>
-            </a:extLst>
-          </p:cNvPr>
-          <p:cNvCxnSpPr/>
-          <p:nvPr/>
-        </p:nvCxnSpPr>
-        <p:spPr>
-          <a:xfrm flipV="1">
-            <a:off x="1847929" y="997505"/>
-            <a:ext cx="0" cy="3517036"/>
-          </a:xfrm>
-          <a:prstGeom prst="line">
-            <a:avLst/>
-          </a:prstGeom>
-          <a:ln>
-            <a:solidFill>
-              <a:srgbClr val="FF0000"/>
-            </a:solidFill>
-          </a:ln>
-        </p:spPr>
-        <p:style>
-          <a:lnRef idx="1">
-            <a:schemeClr val="accent1"/>
-          </a:lnRef>
-          <a:fillRef idx="0">
-            <a:schemeClr val="accent1"/>
-          </a:fillRef>
-          <a:effectRef idx="0">
-            <a:schemeClr val="accent1"/>
-          </a:effectRef>
-          <a:fontRef idx="minor">
-            <a:schemeClr val="tx1"/>
-          </a:fontRef>
-        </p:style>
-      </p:cxnSp>
-      <p:cxnSp>
-        <p:nvCxnSpPr>
-          <p:cNvPr id="36" name="Straight Connector 35">
-            <a:extLst>
-              <a:ext uri="{FF2B5EF4-FFF2-40B4-BE49-F238E27FC236}">
-                <a16:creationId xmlns:a16="http://schemas.microsoft.com/office/drawing/2014/main" id="{332BA220-95AE-4961-ABE6-863A76947433}"/>
-              </a:ext>
-            </a:extLst>
-          </p:cNvPr>
-          <p:cNvCxnSpPr/>
-          <p:nvPr/>
-        </p:nvCxnSpPr>
-        <p:spPr>
-          <a:xfrm flipV="1">
-            <a:off x="7272255" y="1092940"/>
-            <a:ext cx="0" cy="3517036"/>
-          </a:xfrm>
-          <a:prstGeom prst="line">
-            <a:avLst/>
-          </a:prstGeom>
-          <a:ln>
-            <a:solidFill>
-              <a:srgbClr val="FF0000"/>
-            </a:solidFill>
-          </a:ln>
-        </p:spPr>
-        <p:style>
-          <a:lnRef idx="1">
-            <a:schemeClr val="accent1"/>
-          </a:lnRef>
-          <a:fillRef idx="0">
-            <a:schemeClr val="accent1"/>
-          </a:fillRef>
-          <a:effectRef idx="0">
-            <a:schemeClr val="accent1"/>
-          </a:effectRef>
-          <a:fontRef idx="minor">
-            <a:schemeClr val="tx1"/>
-          </a:fontRef>
-        </p:style>
-      </p:cxnSp>
-      <p:cxnSp>
-        <p:nvCxnSpPr>
-          <p:cNvPr id="38" name="Straight Connector 37">
-            <a:extLst>
-              <a:ext uri="{FF2B5EF4-FFF2-40B4-BE49-F238E27FC236}">
-                <a16:creationId xmlns:a16="http://schemas.microsoft.com/office/drawing/2014/main" id="{68E34CE1-6A8A-49BF-B278-D6BD09257B44}"/>
-              </a:ext>
-            </a:extLst>
-          </p:cNvPr>
-          <p:cNvCxnSpPr>
-            <a:cxnSpLocks/>
-          </p:cNvCxnSpPr>
-          <p:nvPr/>
-        </p:nvCxnSpPr>
-        <p:spPr>
-          <a:xfrm flipV="1">
-            <a:off x="6874912" y="1061128"/>
-            <a:ext cx="0" cy="3406099"/>
-          </a:xfrm>
-          <a:prstGeom prst="line">
-            <a:avLst/>
-          </a:prstGeom>
-          <a:ln>
-            <a:solidFill>
-              <a:schemeClr val="accent6">
-                <a:lumMod val="40000"/>
-                <a:lumOff val="60000"/>
-              </a:schemeClr>
-            </a:solidFill>
-          </a:ln>
-        </p:spPr>
-        <p:style>
-          <a:lnRef idx="1">
-            <a:schemeClr val="accent1"/>
-          </a:lnRef>
-          <a:fillRef idx="0">
-            <a:schemeClr val="accent1"/>
-          </a:fillRef>
-          <a:effectRef idx="0">
-            <a:schemeClr val="accent1"/>
-          </a:effectRef>
-          <a:fontRef idx="minor">
-            <a:schemeClr val="tx1"/>
-          </a:fontRef>
-        </p:style>
-      </p:cxnSp>
-      <p:cxnSp>
-        <p:nvCxnSpPr>
-          <p:cNvPr id="40" name="Straight Connector 39">
-            <a:extLst>
-              <a:ext uri="{FF2B5EF4-FFF2-40B4-BE49-F238E27FC236}">
-                <a16:creationId xmlns:a16="http://schemas.microsoft.com/office/drawing/2014/main" id="{8CB51C8B-79F9-484D-A8B7-69D90044D6CF}"/>
-              </a:ext>
-            </a:extLst>
-          </p:cNvPr>
-          <p:cNvCxnSpPr/>
-          <p:nvPr/>
-        </p:nvCxnSpPr>
-        <p:spPr>
-          <a:xfrm flipV="1">
-            <a:off x="4560092" y="1048459"/>
-            <a:ext cx="0" cy="3517036"/>
-          </a:xfrm>
-          <a:prstGeom prst="line">
-            <a:avLst/>
-          </a:prstGeom>
-          <a:ln>
-            <a:solidFill>
-              <a:srgbClr val="FF0000"/>
-            </a:solidFill>
-          </a:ln>
-        </p:spPr>
-        <p:style>
-          <a:lnRef idx="1">
-            <a:schemeClr val="accent1"/>
-          </a:lnRef>
-          <a:fillRef idx="0">
-            <a:schemeClr val="accent1"/>
-          </a:fillRef>
-          <a:effectRef idx="0">
-            <a:schemeClr val="accent1"/>
-          </a:effectRef>
-          <a:fontRef idx="minor">
-            <a:schemeClr val="tx1"/>
-          </a:fontRef>
-        </p:style>
-      </p:cxnSp>
-      <p:cxnSp>
-        <p:nvCxnSpPr>
-          <p:cNvPr id="42" name="Straight Connector 41">
-            <a:extLst>
-              <a:ext uri="{FF2B5EF4-FFF2-40B4-BE49-F238E27FC236}">
-                <a16:creationId xmlns:a16="http://schemas.microsoft.com/office/drawing/2014/main" id="{FD7F9123-C99E-4172-A619-507E5C0438DC}"/>
-              </a:ext>
-            </a:extLst>
-          </p:cNvPr>
-          <p:cNvCxnSpPr/>
-          <p:nvPr/>
-        </p:nvCxnSpPr>
-        <p:spPr>
-          <a:xfrm>
-            <a:off x="6472576" y="1092940"/>
-            <a:ext cx="0" cy="3453413"/>
-          </a:xfrm>
-          <a:prstGeom prst="line">
-            <a:avLst/>
-          </a:prstGeom>
-        </p:spPr>
-        <p:style>
-          <a:lnRef idx="1">
-            <a:schemeClr val="accent1"/>
-          </a:lnRef>
-          <a:fillRef idx="0">
-            <a:schemeClr val="accent1"/>
-          </a:fillRef>
-          <a:effectRef idx="0">
-            <a:schemeClr val="accent1"/>
-          </a:effectRef>
-          <a:fontRef idx="minor">
-            <a:schemeClr val="tx1"/>
-          </a:fontRef>
-        </p:style>
-      </p:cxnSp>
-      <p:cxnSp>
-        <p:nvCxnSpPr>
-          <p:cNvPr id="48" name="Straight Connector 47">
-            <a:extLst>
-              <a:ext uri="{FF2B5EF4-FFF2-40B4-BE49-F238E27FC236}">
-                <a16:creationId xmlns:a16="http://schemas.microsoft.com/office/drawing/2014/main" id="{BFD7D10F-A8EA-41FD-88C4-92C39D087C54}"/>
-              </a:ext>
-            </a:extLst>
-          </p:cNvPr>
-          <p:cNvCxnSpPr>
-            <a:cxnSpLocks/>
-          </p:cNvCxnSpPr>
-          <p:nvPr/>
-        </p:nvCxnSpPr>
-        <p:spPr>
-          <a:xfrm flipV="1">
-            <a:off x="7674591" y="1103927"/>
-            <a:ext cx="0" cy="3406099"/>
-          </a:xfrm>
-          <a:prstGeom prst="line">
-            <a:avLst/>
-          </a:prstGeom>
-          <a:ln>
-            <a:solidFill>
-              <a:schemeClr val="accent6">
-                <a:lumMod val="40000"/>
-                <a:lumOff val="60000"/>
-              </a:schemeClr>
-            </a:solidFill>
-          </a:ln>
-        </p:spPr>
-        <p:style>
-          <a:lnRef idx="1">
-            <a:schemeClr val="accent1"/>
-          </a:lnRef>
-          <a:fillRef idx="0">
-            <a:schemeClr val="accent1"/>
-          </a:fillRef>
-          <a:effectRef idx="0">
-            <a:schemeClr val="accent1"/>
-          </a:effectRef>
-          <a:fontRef idx="minor">
-            <a:schemeClr val="tx1"/>
-          </a:fontRef>
-        </p:style>
-      </p:cxnSp>
-      <p:cxnSp>
-        <p:nvCxnSpPr>
-          <p:cNvPr id="51" name="Straight Connector 50">
-            <a:extLst>
-              <a:ext uri="{FF2B5EF4-FFF2-40B4-BE49-F238E27FC236}">
-                <a16:creationId xmlns:a16="http://schemas.microsoft.com/office/drawing/2014/main" id="{59A45149-3490-4857-B5E8-0AF9D7FDC51F}"/>
-              </a:ext>
-            </a:extLst>
-          </p:cNvPr>
-          <p:cNvCxnSpPr>
-            <a:cxnSpLocks/>
-          </p:cNvCxnSpPr>
-          <p:nvPr/>
-        </p:nvCxnSpPr>
-        <p:spPr>
-          <a:xfrm flipV="1">
-            <a:off x="2257180" y="997505"/>
-            <a:ext cx="0" cy="3406099"/>
-          </a:xfrm>
-          <a:prstGeom prst="line">
-            <a:avLst/>
-          </a:prstGeom>
-          <a:ln>
-            <a:solidFill>
-              <a:schemeClr val="accent6">
-                <a:lumMod val="40000"/>
-                <a:lumOff val="60000"/>
-              </a:schemeClr>
-            </a:solidFill>
-          </a:ln>
-        </p:spPr>
-        <p:style>
-          <a:lnRef idx="1">
-            <a:schemeClr val="accent1"/>
-          </a:lnRef>
-          <a:fillRef idx="0">
-            <a:schemeClr val="accent1"/>
-          </a:fillRef>
-          <a:effectRef idx="0">
-            <a:schemeClr val="accent1"/>
-          </a:effectRef>
-          <a:fontRef idx="minor">
-            <a:schemeClr val="tx1"/>
-          </a:fontRef>
-        </p:style>
-      </p:cxnSp>
-      <p:cxnSp>
-        <p:nvCxnSpPr>
-          <p:cNvPr id="52" name="Straight Connector 51">
-            <a:extLst>
-              <a:ext uri="{FF2B5EF4-FFF2-40B4-BE49-F238E27FC236}">
-                <a16:creationId xmlns:a16="http://schemas.microsoft.com/office/drawing/2014/main" id="{F9FE7BB8-0366-43F8-868B-2AF1ADDC1F59}"/>
-              </a:ext>
-            </a:extLst>
-          </p:cNvPr>
-          <p:cNvCxnSpPr>
-            <a:cxnSpLocks/>
-          </p:cNvCxnSpPr>
-          <p:nvPr/>
-        </p:nvCxnSpPr>
-        <p:spPr>
-          <a:xfrm flipV="1">
-            <a:off x="1445593" y="997504"/>
-            <a:ext cx="0" cy="3406099"/>
-          </a:xfrm>
-          <a:prstGeom prst="line">
-            <a:avLst/>
-          </a:prstGeom>
-          <a:ln>
-            <a:solidFill>
-              <a:schemeClr val="accent6">
-                <a:lumMod val="40000"/>
-                <a:lumOff val="60000"/>
-              </a:schemeClr>
-            </a:solidFill>
-          </a:ln>
-        </p:spPr>
-        <p:style>
-          <a:lnRef idx="1">
-            <a:schemeClr val="accent1"/>
-          </a:lnRef>
-          <a:fillRef idx="0">
-            <a:schemeClr val="accent1"/>
-          </a:fillRef>
-          <a:effectRef idx="0">
-            <a:schemeClr val="accent1"/>
-          </a:effectRef>
-          <a:fontRef idx="minor">
-            <a:schemeClr val="tx1"/>
-          </a:fontRef>
-        </p:style>
-      </p:cxnSp>
       <p:sp>
         <p:nvSpPr>
           <p:cNvPr id="12" name="Oval 11">
@@ -3993,7 +3329,7 @@
         </p:nvSpPr>
         <p:spPr>
           <a:xfrm>
-            <a:off x="1718547" y="1992180"/>
+            <a:off x="3728522" y="1647066"/>
             <a:ext cx="265265" cy="220540"/>
           </a:xfrm>
           <a:prstGeom prst="ellipse">
@@ -4301,6 +3637,2088 @@
           <a:chExt cx="0" cy="0"/>
         </a:xfrm>
       </p:grpSpPr>
+      <p:cxnSp>
+        <p:nvCxnSpPr>
+          <p:cNvPr id="18" name="Straight Connector 17">
+            <a:extLst>
+              <a:ext uri="{FF2B5EF4-FFF2-40B4-BE49-F238E27FC236}">
+                <a16:creationId xmlns:a16="http://schemas.microsoft.com/office/drawing/2014/main" id="{15EC7B01-C95D-446B-86CF-863B18F5AB5B}"/>
+              </a:ext>
+            </a:extLst>
+          </p:cNvPr>
+          <p:cNvCxnSpPr>
+            <a:cxnSpLocks/>
+          </p:cNvCxnSpPr>
+          <p:nvPr/>
+        </p:nvCxnSpPr>
+        <p:spPr>
+          <a:xfrm flipH="1">
+            <a:off x="159595" y="1308102"/>
+            <a:ext cx="8637972" cy="0"/>
+          </a:xfrm>
+          <a:prstGeom prst="line">
+            <a:avLst/>
+          </a:prstGeom>
+        </p:spPr>
+        <p:style>
+          <a:lnRef idx="1">
+            <a:schemeClr val="accent1"/>
+          </a:lnRef>
+          <a:fillRef idx="0">
+            <a:schemeClr val="accent1"/>
+          </a:fillRef>
+          <a:effectRef idx="0">
+            <a:schemeClr val="accent1"/>
+          </a:effectRef>
+          <a:fontRef idx="minor">
+            <a:schemeClr val="tx1"/>
+          </a:fontRef>
+        </p:style>
+      </p:cxnSp>
+      <p:cxnSp>
+        <p:nvCxnSpPr>
+          <p:cNvPr id="20" name="Straight Connector 19">
+            <a:extLst>
+              <a:ext uri="{FF2B5EF4-FFF2-40B4-BE49-F238E27FC236}">
+                <a16:creationId xmlns:a16="http://schemas.microsoft.com/office/drawing/2014/main" id="{80EB5DBF-9C15-40E6-9C65-ABE5FDFD472A}"/>
+              </a:ext>
+            </a:extLst>
+          </p:cNvPr>
+          <p:cNvCxnSpPr>
+            <a:cxnSpLocks/>
+          </p:cNvCxnSpPr>
+          <p:nvPr/>
+        </p:nvCxnSpPr>
+        <p:spPr>
+          <a:xfrm flipH="1">
+            <a:off x="159595" y="1753326"/>
+            <a:ext cx="8637972" cy="0"/>
+          </a:xfrm>
+          <a:prstGeom prst="line">
+            <a:avLst/>
+          </a:prstGeom>
+        </p:spPr>
+        <p:style>
+          <a:lnRef idx="1">
+            <a:schemeClr val="accent1"/>
+          </a:lnRef>
+          <a:fillRef idx="0">
+            <a:schemeClr val="accent1"/>
+          </a:fillRef>
+          <a:effectRef idx="0">
+            <a:schemeClr val="accent1"/>
+          </a:effectRef>
+          <a:fontRef idx="minor">
+            <a:schemeClr val="tx1"/>
+          </a:fontRef>
+        </p:style>
+      </p:cxnSp>
+      <p:cxnSp>
+        <p:nvCxnSpPr>
+          <p:cNvPr id="21" name="Straight Connector 20">
+            <a:extLst>
+              <a:ext uri="{FF2B5EF4-FFF2-40B4-BE49-F238E27FC236}">
+                <a16:creationId xmlns:a16="http://schemas.microsoft.com/office/drawing/2014/main" id="{50C5EE44-85F4-44D0-9DFA-7AE59239EAD0}"/>
+              </a:ext>
+            </a:extLst>
+          </p:cNvPr>
+          <p:cNvCxnSpPr>
+            <a:cxnSpLocks/>
+          </p:cNvCxnSpPr>
+          <p:nvPr/>
+        </p:nvCxnSpPr>
+        <p:spPr>
+          <a:xfrm>
+            <a:off x="5207830" y="1029317"/>
+            <a:ext cx="0" cy="2000821"/>
+          </a:xfrm>
+          <a:prstGeom prst="line">
+            <a:avLst/>
+          </a:prstGeom>
+        </p:spPr>
+        <p:style>
+          <a:lnRef idx="1">
+            <a:schemeClr val="accent1"/>
+          </a:lnRef>
+          <a:fillRef idx="0">
+            <a:schemeClr val="accent1"/>
+          </a:fillRef>
+          <a:effectRef idx="0">
+            <a:schemeClr val="accent1"/>
+          </a:effectRef>
+          <a:fontRef idx="minor">
+            <a:schemeClr val="tx1"/>
+          </a:fontRef>
+        </p:style>
+      </p:cxnSp>
+      <p:cxnSp>
+        <p:nvCxnSpPr>
+          <p:cNvPr id="22" name="Straight Connector 21">
+            <a:extLst>
+              <a:ext uri="{FF2B5EF4-FFF2-40B4-BE49-F238E27FC236}">
+                <a16:creationId xmlns:a16="http://schemas.microsoft.com/office/drawing/2014/main" id="{8FFEA17C-50FF-4426-AE85-F2527EDEBC89}"/>
+              </a:ext>
+            </a:extLst>
+          </p:cNvPr>
+          <p:cNvCxnSpPr>
+            <a:cxnSpLocks/>
+          </p:cNvCxnSpPr>
+          <p:nvPr/>
+        </p:nvCxnSpPr>
+        <p:spPr>
+          <a:xfrm>
+            <a:off x="3909819" y="1048459"/>
+            <a:ext cx="0" cy="2000821"/>
+          </a:xfrm>
+          <a:prstGeom prst="line">
+            <a:avLst/>
+          </a:prstGeom>
+        </p:spPr>
+        <p:style>
+          <a:lnRef idx="1">
+            <a:schemeClr val="accent1"/>
+          </a:lnRef>
+          <a:fillRef idx="0">
+            <a:schemeClr val="accent1"/>
+          </a:fillRef>
+          <a:effectRef idx="0">
+            <a:schemeClr val="accent1"/>
+          </a:effectRef>
+          <a:fontRef idx="minor">
+            <a:schemeClr val="tx1"/>
+          </a:fontRef>
+        </p:style>
+      </p:cxnSp>
+      <p:cxnSp>
+        <p:nvCxnSpPr>
+          <p:cNvPr id="34" name="Straight Connector 33">
+            <a:extLst>
+              <a:ext uri="{FF2B5EF4-FFF2-40B4-BE49-F238E27FC236}">
+                <a16:creationId xmlns:a16="http://schemas.microsoft.com/office/drawing/2014/main" id="{A4971B96-589B-4B65-A9F4-86E72142DC00}"/>
+              </a:ext>
+            </a:extLst>
+          </p:cNvPr>
+          <p:cNvCxnSpPr>
+            <a:cxnSpLocks/>
+          </p:cNvCxnSpPr>
+          <p:nvPr/>
+        </p:nvCxnSpPr>
+        <p:spPr>
+          <a:xfrm flipH="1">
+            <a:off x="159595" y="2218715"/>
+            <a:ext cx="8637972" cy="0"/>
+          </a:xfrm>
+          <a:prstGeom prst="line">
+            <a:avLst/>
+          </a:prstGeom>
+        </p:spPr>
+        <p:style>
+          <a:lnRef idx="1">
+            <a:schemeClr val="accent1"/>
+          </a:lnRef>
+          <a:fillRef idx="0">
+            <a:schemeClr val="accent1"/>
+          </a:fillRef>
+          <a:effectRef idx="0">
+            <a:schemeClr val="accent1"/>
+          </a:effectRef>
+          <a:fontRef idx="minor">
+            <a:schemeClr val="tx1"/>
+          </a:fontRef>
+        </p:style>
+      </p:cxnSp>
+      <p:sp>
+        <p:nvSpPr>
+          <p:cNvPr id="26" name="TextBox 25">
+            <a:extLst>
+              <a:ext uri="{FF2B5EF4-FFF2-40B4-BE49-F238E27FC236}">
+                <a16:creationId xmlns:a16="http://schemas.microsoft.com/office/drawing/2014/main" id="{8A8F4799-27F1-41D6-B3B8-0827BDE3EC72}"/>
+              </a:ext>
+            </a:extLst>
+          </p:cNvPr>
+          <p:cNvSpPr txBox="1"/>
+          <p:nvPr/>
+        </p:nvSpPr>
+        <p:spPr>
+          <a:xfrm>
+            <a:off x="228887" y="319512"/>
+            <a:ext cx="2853153" cy="369332"/>
+          </a:xfrm>
+          <a:prstGeom prst="rect">
+            <a:avLst/>
+          </a:prstGeom>
+          <a:noFill/>
+        </p:spPr>
+        <p:txBody>
+          <a:bodyPr wrap="none" rtlCol="0">
+            <a:spAutoFit/>
+          </a:bodyPr>
+          <a:lstStyle/>
+          <a:p>
+            <a:r>
+              <a:rPr lang="en-US" dirty="0" err="1"/>
+              <a:t>DefaultFor</a:t>
+            </a:r>
+            <a:r>
+              <a:rPr lang="en-US" dirty="0"/>
+              <a:t>=</a:t>
+            </a:r>
+            <a:r>
+              <a:rPr lang="en-US" dirty="0" err="1"/>
+              <a:t>Formation_Lines</a:t>
+            </a:r>
+            <a:endParaRPr lang="en-US" dirty="0"/>
+          </a:p>
+        </p:txBody>
+      </p:sp>
+      <p:sp>
+        <p:nvSpPr>
+          <p:cNvPr id="27" name="TextBox 26">
+            <a:extLst>
+              <a:ext uri="{FF2B5EF4-FFF2-40B4-BE49-F238E27FC236}">
+                <a16:creationId xmlns:a16="http://schemas.microsoft.com/office/drawing/2014/main" id="{7E81A3E1-7E69-41E7-B831-7D403BECCAEE}"/>
+              </a:ext>
+            </a:extLst>
+          </p:cNvPr>
+          <p:cNvSpPr txBox="1"/>
+          <p:nvPr/>
+        </p:nvSpPr>
+        <p:spPr>
+          <a:xfrm>
+            <a:off x="212825" y="41964"/>
+            <a:ext cx="2292166" cy="369332"/>
+          </a:xfrm>
+          <a:prstGeom prst="rect">
+            <a:avLst/>
+          </a:prstGeom>
+          <a:noFill/>
+        </p:spPr>
+        <p:txBody>
+          <a:bodyPr wrap="none" rtlCol="0">
+            <a:spAutoFit/>
+          </a:bodyPr>
+          <a:lstStyle/>
+          <a:p>
+            <a:r>
+              <a:rPr lang="en-US" dirty="0" err="1"/>
+              <a:t>TemplateType</a:t>
+            </a:r>
+            <a:r>
+              <a:rPr lang="en-US" dirty="0"/>
+              <a:t>=Default</a:t>
+            </a:r>
+          </a:p>
+        </p:txBody>
+      </p:sp>
+      <p:cxnSp>
+        <p:nvCxnSpPr>
+          <p:cNvPr id="28" name="Straight Connector 27">
+            <a:extLst>
+              <a:ext uri="{FF2B5EF4-FFF2-40B4-BE49-F238E27FC236}">
+                <a16:creationId xmlns:a16="http://schemas.microsoft.com/office/drawing/2014/main" id="{06AAAFFE-740E-4AB6-9B7F-81C6C406FB63}"/>
+              </a:ext>
+            </a:extLst>
+          </p:cNvPr>
+          <p:cNvCxnSpPr/>
+          <p:nvPr/>
+        </p:nvCxnSpPr>
+        <p:spPr>
+          <a:xfrm>
+            <a:off x="1034113" y="1029317"/>
+            <a:ext cx="0" cy="3453413"/>
+          </a:xfrm>
+          <a:prstGeom prst="line">
+            <a:avLst/>
+          </a:prstGeom>
+        </p:spPr>
+        <p:style>
+          <a:lnRef idx="1">
+            <a:schemeClr val="accent1"/>
+          </a:lnRef>
+          <a:fillRef idx="0">
+            <a:schemeClr val="accent1"/>
+          </a:fillRef>
+          <a:effectRef idx="0">
+            <a:schemeClr val="accent1"/>
+          </a:effectRef>
+          <a:fontRef idx="minor">
+            <a:schemeClr val="tx1"/>
+          </a:fontRef>
+        </p:style>
+      </p:cxnSp>
+      <p:cxnSp>
+        <p:nvCxnSpPr>
+          <p:cNvPr id="29" name="Straight Connector 28">
+            <a:extLst>
+              <a:ext uri="{FF2B5EF4-FFF2-40B4-BE49-F238E27FC236}">
+                <a16:creationId xmlns:a16="http://schemas.microsoft.com/office/drawing/2014/main" id="{B93B0CEF-6588-4585-BDC2-FEBBEF8DBA3C}"/>
+              </a:ext>
+            </a:extLst>
+          </p:cNvPr>
+          <p:cNvCxnSpPr/>
+          <p:nvPr/>
+        </p:nvCxnSpPr>
+        <p:spPr>
+          <a:xfrm>
+            <a:off x="8089419" y="1112082"/>
+            <a:ext cx="0" cy="3453413"/>
+          </a:xfrm>
+          <a:prstGeom prst="line">
+            <a:avLst/>
+          </a:prstGeom>
+        </p:spPr>
+        <p:style>
+          <a:lnRef idx="1">
+            <a:schemeClr val="accent1"/>
+          </a:lnRef>
+          <a:fillRef idx="0">
+            <a:schemeClr val="accent1"/>
+          </a:fillRef>
+          <a:effectRef idx="0">
+            <a:schemeClr val="accent1"/>
+          </a:effectRef>
+          <a:fontRef idx="minor">
+            <a:schemeClr val="tx1"/>
+          </a:fontRef>
+        </p:style>
+      </p:cxnSp>
+      <p:cxnSp>
+        <p:nvCxnSpPr>
+          <p:cNvPr id="30" name="Straight Connector 29">
+            <a:extLst>
+              <a:ext uri="{FF2B5EF4-FFF2-40B4-BE49-F238E27FC236}">
+                <a16:creationId xmlns:a16="http://schemas.microsoft.com/office/drawing/2014/main" id="{DAE7B122-E63E-4553-A63E-6B43EC77728D}"/>
+              </a:ext>
+            </a:extLst>
+          </p:cNvPr>
+          <p:cNvCxnSpPr/>
+          <p:nvPr/>
+        </p:nvCxnSpPr>
+        <p:spPr>
+          <a:xfrm>
+            <a:off x="2659516" y="1061128"/>
+            <a:ext cx="0" cy="3453413"/>
+          </a:xfrm>
+          <a:prstGeom prst="line">
+            <a:avLst/>
+          </a:prstGeom>
+        </p:spPr>
+        <p:style>
+          <a:lnRef idx="1">
+            <a:schemeClr val="accent1"/>
+          </a:lnRef>
+          <a:fillRef idx="0">
+            <a:schemeClr val="accent1"/>
+          </a:fillRef>
+          <a:effectRef idx="0">
+            <a:schemeClr val="accent1"/>
+          </a:effectRef>
+          <a:fontRef idx="minor">
+            <a:schemeClr val="tx1"/>
+          </a:fontRef>
+        </p:style>
+      </p:cxnSp>
+      <p:cxnSp>
+        <p:nvCxnSpPr>
+          <p:cNvPr id="35" name="Straight Connector 34">
+            <a:extLst>
+              <a:ext uri="{FF2B5EF4-FFF2-40B4-BE49-F238E27FC236}">
+                <a16:creationId xmlns:a16="http://schemas.microsoft.com/office/drawing/2014/main" id="{DA4CA6BB-FAB2-443C-AE1E-DACB6A26C273}"/>
+              </a:ext>
+            </a:extLst>
+          </p:cNvPr>
+          <p:cNvCxnSpPr/>
+          <p:nvPr/>
+        </p:nvCxnSpPr>
+        <p:spPr>
+          <a:xfrm flipV="1">
+            <a:off x="1847929" y="997505"/>
+            <a:ext cx="0" cy="3517036"/>
+          </a:xfrm>
+          <a:prstGeom prst="line">
+            <a:avLst/>
+          </a:prstGeom>
+          <a:ln>
+            <a:solidFill>
+              <a:srgbClr val="FF0000"/>
+            </a:solidFill>
+          </a:ln>
+        </p:spPr>
+        <p:style>
+          <a:lnRef idx="1">
+            <a:schemeClr val="accent1"/>
+          </a:lnRef>
+          <a:fillRef idx="0">
+            <a:schemeClr val="accent1"/>
+          </a:fillRef>
+          <a:effectRef idx="0">
+            <a:schemeClr val="accent1"/>
+          </a:effectRef>
+          <a:fontRef idx="minor">
+            <a:schemeClr val="tx1"/>
+          </a:fontRef>
+        </p:style>
+      </p:cxnSp>
+      <p:cxnSp>
+        <p:nvCxnSpPr>
+          <p:cNvPr id="36" name="Straight Connector 35">
+            <a:extLst>
+              <a:ext uri="{FF2B5EF4-FFF2-40B4-BE49-F238E27FC236}">
+                <a16:creationId xmlns:a16="http://schemas.microsoft.com/office/drawing/2014/main" id="{332BA220-95AE-4961-ABE6-863A76947433}"/>
+              </a:ext>
+            </a:extLst>
+          </p:cNvPr>
+          <p:cNvCxnSpPr/>
+          <p:nvPr/>
+        </p:nvCxnSpPr>
+        <p:spPr>
+          <a:xfrm flipV="1">
+            <a:off x="7272255" y="1092940"/>
+            <a:ext cx="0" cy="3517036"/>
+          </a:xfrm>
+          <a:prstGeom prst="line">
+            <a:avLst/>
+          </a:prstGeom>
+          <a:ln>
+            <a:solidFill>
+              <a:srgbClr val="FF0000"/>
+            </a:solidFill>
+          </a:ln>
+        </p:spPr>
+        <p:style>
+          <a:lnRef idx="1">
+            <a:schemeClr val="accent1"/>
+          </a:lnRef>
+          <a:fillRef idx="0">
+            <a:schemeClr val="accent1"/>
+          </a:fillRef>
+          <a:effectRef idx="0">
+            <a:schemeClr val="accent1"/>
+          </a:effectRef>
+          <a:fontRef idx="minor">
+            <a:schemeClr val="tx1"/>
+          </a:fontRef>
+        </p:style>
+      </p:cxnSp>
+      <p:cxnSp>
+        <p:nvCxnSpPr>
+          <p:cNvPr id="38" name="Straight Connector 37">
+            <a:extLst>
+              <a:ext uri="{FF2B5EF4-FFF2-40B4-BE49-F238E27FC236}">
+                <a16:creationId xmlns:a16="http://schemas.microsoft.com/office/drawing/2014/main" id="{68E34CE1-6A8A-49BF-B278-D6BD09257B44}"/>
+              </a:ext>
+            </a:extLst>
+          </p:cNvPr>
+          <p:cNvCxnSpPr>
+            <a:cxnSpLocks/>
+          </p:cNvCxnSpPr>
+          <p:nvPr/>
+        </p:nvCxnSpPr>
+        <p:spPr>
+          <a:xfrm flipV="1">
+            <a:off x="6874912" y="1061128"/>
+            <a:ext cx="0" cy="3406099"/>
+          </a:xfrm>
+          <a:prstGeom prst="line">
+            <a:avLst/>
+          </a:prstGeom>
+          <a:ln>
+            <a:solidFill>
+              <a:schemeClr val="accent6">
+                <a:lumMod val="40000"/>
+                <a:lumOff val="60000"/>
+              </a:schemeClr>
+            </a:solidFill>
+          </a:ln>
+        </p:spPr>
+        <p:style>
+          <a:lnRef idx="1">
+            <a:schemeClr val="accent1"/>
+          </a:lnRef>
+          <a:fillRef idx="0">
+            <a:schemeClr val="accent1"/>
+          </a:fillRef>
+          <a:effectRef idx="0">
+            <a:schemeClr val="accent1"/>
+          </a:effectRef>
+          <a:fontRef idx="minor">
+            <a:schemeClr val="tx1"/>
+          </a:fontRef>
+        </p:style>
+      </p:cxnSp>
+      <p:cxnSp>
+        <p:nvCxnSpPr>
+          <p:cNvPr id="40" name="Straight Connector 39">
+            <a:extLst>
+              <a:ext uri="{FF2B5EF4-FFF2-40B4-BE49-F238E27FC236}">
+                <a16:creationId xmlns:a16="http://schemas.microsoft.com/office/drawing/2014/main" id="{8CB51C8B-79F9-484D-A8B7-69D90044D6CF}"/>
+              </a:ext>
+            </a:extLst>
+          </p:cNvPr>
+          <p:cNvCxnSpPr/>
+          <p:nvPr/>
+        </p:nvCxnSpPr>
+        <p:spPr>
+          <a:xfrm flipV="1">
+            <a:off x="4560092" y="1048459"/>
+            <a:ext cx="0" cy="3517036"/>
+          </a:xfrm>
+          <a:prstGeom prst="line">
+            <a:avLst/>
+          </a:prstGeom>
+          <a:ln>
+            <a:solidFill>
+              <a:srgbClr val="FF0000"/>
+            </a:solidFill>
+          </a:ln>
+        </p:spPr>
+        <p:style>
+          <a:lnRef idx="1">
+            <a:schemeClr val="accent1"/>
+          </a:lnRef>
+          <a:fillRef idx="0">
+            <a:schemeClr val="accent1"/>
+          </a:fillRef>
+          <a:effectRef idx="0">
+            <a:schemeClr val="accent1"/>
+          </a:effectRef>
+          <a:fontRef idx="minor">
+            <a:schemeClr val="tx1"/>
+          </a:fontRef>
+        </p:style>
+      </p:cxnSp>
+      <p:cxnSp>
+        <p:nvCxnSpPr>
+          <p:cNvPr id="42" name="Straight Connector 41">
+            <a:extLst>
+              <a:ext uri="{FF2B5EF4-FFF2-40B4-BE49-F238E27FC236}">
+                <a16:creationId xmlns:a16="http://schemas.microsoft.com/office/drawing/2014/main" id="{FD7F9123-C99E-4172-A619-507E5C0438DC}"/>
+              </a:ext>
+            </a:extLst>
+          </p:cNvPr>
+          <p:cNvCxnSpPr/>
+          <p:nvPr/>
+        </p:nvCxnSpPr>
+        <p:spPr>
+          <a:xfrm>
+            <a:off x="6472576" y="1092940"/>
+            <a:ext cx="0" cy="3453413"/>
+          </a:xfrm>
+          <a:prstGeom prst="line">
+            <a:avLst/>
+          </a:prstGeom>
+        </p:spPr>
+        <p:style>
+          <a:lnRef idx="1">
+            <a:schemeClr val="accent1"/>
+          </a:lnRef>
+          <a:fillRef idx="0">
+            <a:schemeClr val="accent1"/>
+          </a:fillRef>
+          <a:effectRef idx="0">
+            <a:schemeClr val="accent1"/>
+          </a:effectRef>
+          <a:fontRef idx="minor">
+            <a:schemeClr val="tx1"/>
+          </a:fontRef>
+        </p:style>
+      </p:cxnSp>
+      <p:cxnSp>
+        <p:nvCxnSpPr>
+          <p:cNvPr id="48" name="Straight Connector 47">
+            <a:extLst>
+              <a:ext uri="{FF2B5EF4-FFF2-40B4-BE49-F238E27FC236}">
+                <a16:creationId xmlns:a16="http://schemas.microsoft.com/office/drawing/2014/main" id="{BFD7D10F-A8EA-41FD-88C4-92C39D087C54}"/>
+              </a:ext>
+            </a:extLst>
+          </p:cNvPr>
+          <p:cNvCxnSpPr>
+            <a:cxnSpLocks/>
+          </p:cNvCxnSpPr>
+          <p:nvPr/>
+        </p:nvCxnSpPr>
+        <p:spPr>
+          <a:xfrm flipV="1">
+            <a:off x="7674591" y="1103927"/>
+            <a:ext cx="0" cy="3406099"/>
+          </a:xfrm>
+          <a:prstGeom prst="line">
+            <a:avLst/>
+          </a:prstGeom>
+          <a:ln>
+            <a:solidFill>
+              <a:schemeClr val="accent6">
+                <a:lumMod val="40000"/>
+                <a:lumOff val="60000"/>
+              </a:schemeClr>
+            </a:solidFill>
+          </a:ln>
+        </p:spPr>
+        <p:style>
+          <a:lnRef idx="1">
+            <a:schemeClr val="accent1"/>
+          </a:lnRef>
+          <a:fillRef idx="0">
+            <a:schemeClr val="accent1"/>
+          </a:fillRef>
+          <a:effectRef idx="0">
+            <a:schemeClr val="accent1"/>
+          </a:effectRef>
+          <a:fontRef idx="minor">
+            <a:schemeClr val="tx1"/>
+          </a:fontRef>
+        </p:style>
+      </p:cxnSp>
+      <p:cxnSp>
+        <p:nvCxnSpPr>
+          <p:cNvPr id="51" name="Straight Connector 50">
+            <a:extLst>
+              <a:ext uri="{FF2B5EF4-FFF2-40B4-BE49-F238E27FC236}">
+                <a16:creationId xmlns:a16="http://schemas.microsoft.com/office/drawing/2014/main" id="{59A45149-3490-4857-B5E8-0AF9D7FDC51F}"/>
+              </a:ext>
+            </a:extLst>
+          </p:cNvPr>
+          <p:cNvCxnSpPr>
+            <a:cxnSpLocks/>
+          </p:cNvCxnSpPr>
+          <p:nvPr/>
+        </p:nvCxnSpPr>
+        <p:spPr>
+          <a:xfrm flipV="1">
+            <a:off x="2257180" y="997505"/>
+            <a:ext cx="0" cy="3406099"/>
+          </a:xfrm>
+          <a:prstGeom prst="line">
+            <a:avLst/>
+          </a:prstGeom>
+          <a:ln>
+            <a:solidFill>
+              <a:schemeClr val="accent6">
+                <a:lumMod val="40000"/>
+                <a:lumOff val="60000"/>
+              </a:schemeClr>
+            </a:solidFill>
+          </a:ln>
+        </p:spPr>
+        <p:style>
+          <a:lnRef idx="1">
+            <a:schemeClr val="accent1"/>
+          </a:lnRef>
+          <a:fillRef idx="0">
+            <a:schemeClr val="accent1"/>
+          </a:fillRef>
+          <a:effectRef idx="0">
+            <a:schemeClr val="accent1"/>
+          </a:effectRef>
+          <a:fontRef idx="minor">
+            <a:schemeClr val="tx1"/>
+          </a:fontRef>
+        </p:style>
+      </p:cxnSp>
+      <p:cxnSp>
+        <p:nvCxnSpPr>
+          <p:cNvPr id="52" name="Straight Connector 51">
+            <a:extLst>
+              <a:ext uri="{FF2B5EF4-FFF2-40B4-BE49-F238E27FC236}">
+                <a16:creationId xmlns:a16="http://schemas.microsoft.com/office/drawing/2014/main" id="{F9FE7BB8-0366-43F8-868B-2AF1ADDC1F59}"/>
+              </a:ext>
+            </a:extLst>
+          </p:cNvPr>
+          <p:cNvCxnSpPr>
+            <a:cxnSpLocks/>
+          </p:cNvCxnSpPr>
+          <p:nvPr/>
+        </p:nvCxnSpPr>
+        <p:spPr>
+          <a:xfrm flipV="1">
+            <a:off x="1445593" y="997504"/>
+            <a:ext cx="0" cy="3406099"/>
+          </a:xfrm>
+          <a:prstGeom prst="line">
+            <a:avLst/>
+          </a:prstGeom>
+          <a:ln>
+            <a:solidFill>
+              <a:schemeClr val="accent6">
+                <a:lumMod val="40000"/>
+                <a:lumOff val="60000"/>
+              </a:schemeClr>
+            </a:solidFill>
+          </a:ln>
+        </p:spPr>
+        <p:style>
+          <a:lnRef idx="1">
+            <a:schemeClr val="accent1"/>
+          </a:lnRef>
+          <a:fillRef idx="0">
+            <a:schemeClr val="accent1"/>
+          </a:fillRef>
+          <a:effectRef idx="0">
+            <a:schemeClr val="accent1"/>
+          </a:effectRef>
+          <a:fontRef idx="minor">
+            <a:schemeClr val="tx1"/>
+          </a:fontRef>
+        </p:style>
+      </p:cxnSp>
+    </p:spTree>
+    <p:extLst>
+      <p:ext uri="{BB962C8B-B14F-4D97-AF65-F5344CB8AC3E}">
+        <p14:creationId xmlns:p14="http://schemas.microsoft.com/office/powerpoint/2010/main" val="3516213189"/>
+      </p:ext>
+    </p:extLst>
+  </p:cSld>
+  <p:clrMapOvr>
+    <a:masterClrMapping/>
+  </p:clrMapOvr>
+</p:sld>
+</file>
+
+<file path=ppt/slides/slide3.xml><?xml version="1.0" encoding="utf-8"?>
+<p:sld xmlns:a="http://schemas.openxmlformats.org/drawingml/2006/main" xmlns:r="http://schemas.openxmlformats.org/officeDocument/2006/relationships" xmlns:p="http://schemas.openxmlformats.org/presentationml/2006/main">
+  <p:cSld>
+    <p:spTree>
+      <p:nvGrpSpPr>
+        <p:cNvPr id="1" name=""/>
+        <p:cNvGrpSpPr/>
+        <p:nvPr/>
+      </p:nvGrpSpPr>
+      <p:grpSpPr>
+        <a:xfrm>
+          <a:off x="0" y="0"/>
+          <a:ext cx="0" cy="0"/>
+          <a:chOff x="0" y="0"/>
+          <a:chExt cx="0" cy="0"/>
+        </a:xfrm>
+      </p:grpSpPr>
+      <p:pic>
+        <p:nvPicPr>
+          <p:cNvPr id="53" name="Picture 52">
+            <a:extLst>
+              <a:ext uri="{FF2B5EF4-FFF2-40B4-BE49-F238E27FC236}">
+                <a16:creationId xmlns:a16="http://schemas.microsoft.com/office/drawing/2014/main" id="{7DA85D94-D37F-48F1-BC2C-59DBFC9300A8}"/>
+              </a:ext>
+            </a:extLst>
+          </p:cNvPr>
+          <p:cNvPicPr>
+            <a:picLocks noChangeAspect="1"/>
+          </p:cNvPicPr>
+          <p:nvPr/>
+        </p:nvPicPr>
+        <p:blipFill>
+          <a:blip r:embed="rId2"/>
+          <a:stretch>
+            <a:fillRect/>
+          </a:stretch>
+        </p:blipFill>
+        <p:spPr>
+          <a:xfrm>
+            <a:off x="34692" y="2455233"/>
+            <a:ext cx="9074616" cy="3860998"/>
+          </a:xfrm>
+          <a:prstGeom prst="rect">
+            <a:avLst/>
+          </a:prstGeom>
+        </p:spPr>
+      </p:pic>
+      <p:sp>
+        <p:nvSpPr>
+          <p:cNvPr id="23" name="Rectangle 22">
+            <a:extLst>
+              <a:ext uri="{FF2B5EF4-FFF2-40B4-BE49-F238E27FC236}">
+                <a16:creationId xmlns:a16="http://schemas.microsoft.com/office/drawing/2014/main" id="{67C1B33B-9A9D-415B-AE9C-B305F011AE4F}"/>
+              </a:ext>
+            </a:extLst>
+          </p:cNvPr>
+          <p:cNvSpPr>
+            <a:spLocks noChangeAspect="1"/>
+          </p:cNvSpPr>
+          <p:nvPr/>
+        </p:nvSpPr>
+        <p:spPr>
+          <a:xfrm>
+            <a:off x="4428464" y="2236912"/>
+            <a:ext cx="265263" cy="198948"/>
+          </a:xfrm>
+          <a:prstGeom prst="rect">
+            <a:avLst/>
+          </a:prstGeom>
+        </p:spPr>
+        <p:style>
+          <a:lnRef idx="2">
+            <a:schemeClr val="accent1">
+              <a:shade val="50000"/>
+            </a:schemeClr>
+          </a:lnRef>
+          <a:fillRef idx="1">
+            <a:schemeClr val="accent1"/>
+          </a:fillRef>
+          <a:effectRef idx="0">
+            <a:schemeClr val="accent1"/>
+          </a:effectRef>
+          <a:fontRef idx="minor">
+            <a:schemeClr val="lt1"/>
+          </a:fontRef>
+        </p:style>
+        <p:txBody>
+          <a:bodyPr rtlCol="0" anchor="ctr"/>
+          <a:lstStyle/>
+          <a:p>
+            <a:pPr algn="ctr"/>
+            <a:r>
+              <a:rPr lang="en-US" dirty="0"/>
+              <a:t>C</a:t>
+            </a:r>
+          </a:p>
+        </p:txBody>
+      </p:sp>
+      <p:sp>
+        <p:nvSpPr>
+          <p:cNvPr id="25" name="Oval 24">
+            <a:extLst>
+              <a:ext uri="{FF2B5EF4-FFF2-40B4-BE49-F238E27FC236}">
+                <a16:creationId xmlns:a16="http://schemas.microsoft.com/office/drawing/2014/main" id="{1013C909-B2E1-4AB1-B2A0-8B5CECBDFB02}"/>
+              </a:ext>
+            </a:extLst>
+          </p:cNvPr>
+          <p:cNvSpPr>
+            <a:spLocks noChangeAspect="1"/>
+          </p:cNvSpPr>
+          <p:nvPr/>
+        </p:nvSpPr>
+        <p:spPr>
+          <a:xfrm>
+            <a:off x="4017679" y="2230562"/>
+            <a:ext cx="265265" cy="220540"/>
+          </a:xfrm>
+          <a:prstGeom prst="ellipse">
+            <a:avLst/>
+          </a:prstGeom>
+        </p:spPr>
+        <p:style>
+          <a:lnRef idx="2">
+            <a:schemeClr val="accent1">
+              <a:shade val="50000"/>
+            </a:schemeClr>
+          </a:lnRef>
+          <a:fillRef idx="1">
+            <a:schemeClr val="accent1"/>
+          </a:fillRef>
+          <a:effectRef idx="0">
+            <a:schemeClr val="accent1"/>
+          </a:effectRef>
+          <a:fontRef idx="minor">
+            <a:schemeClr val="lt1"/>
+          </a:fontRef>
+        </p:style>
+        <p:txBody>
+          <a:bodyPr rtlCol="0" anchor="ctr"/>
+          <a:lstStyle/>
+          <a:p>
+            <a:pPr algn="ctr"/>
+            <a:r>
+              <a:rPr lang="en-US" dirty="0"/>
+              <a:t>G</a:t>
+            </a:r>
+          </a:p>
+        </p:txBody>
+      </p:sp>
+      <p:sp>
+        <p:nvSpPr>
+          <p:cNvPr id="31" name="Oval 30">
+            <a:extLst>
+              <a:ext uri="{FF2B5EF4-FFF2-40B4-BE49-F238E27FC236}">
+                <a16:creationId xmlns:a16="http://schemas.microsoft.com/office/drawing/2014/main" id="{EFB4357D-8F8C-47D2-A995-F881460E3FDB}"/>
+              </a:ext>
+            </a:extLst>
+          </p:cNvPr>
+          <p:cNvSpPr>
+            <a:spLocks noChangeAspect="1"/>
+          </p:cNvSpPr>
+          <p:nvPr/>
+        </p:nvSpPr>
+        <p:spPr>
+          <a:xfrm>
+            <a:off x="4851375" y="2230562"/>
+            <a:ext cx="265265" cy="220540"/>
+          </a:xfrm>
+          <a:prstGeom prst="ellipse">
+            <a:avLst/>
+          </a:prstGeom>
+        </p:spPr>
+        <p:style>
+          <a:lnRef idx="2">
+            <a:schemeClr val="accent1">
+              <a:shade val="50000"/>
+            </a:schemeClr>
+          </a:lnRef>
+          <a:fillRef idx="1">
+            <a:schemeClr val="accent1"/>
+          </a:fillRef>
+          <a:effectRef idx="0">
+            <a:schemeClr val="accent1"/>
+          </a:effectRef>
+          <a:fontRef idx="minor">
+            <a:schemeClr val="lt1"/>
+          </a:fontRef>
+        </p:style>
+        <p:txBody>
+          <a:bodyPr rtlCol="0" anchor="ctr"/>
+          <a:lstStyle/>
+          <a:p>
+            <a:pPr algn="ctr"/>
+            <a:r>
+              <a:rPr lang="en-US" dirty="0"/>
+              <a:t>G</a:t>
+            </a:r>
+          </a:p>
+        </p:txBody>
+      </p:sp>
+      <p:sp>
+        <p:nvSpPr>
+          <p:cNvPr id="32" name="Oval 31">
+            <a:extLst>
+              <a:ext uri="{FF2B5EF4-FFF2-40B4-BE49-F238E27FC236}">
+                <a16:creationId xmlns:a16="http://schemas.microsoft.com/office/drawing/2014/main" id="{CB7AB0B9-61DD-42A5-82B1-FDC50C19CBD6}"/>
+              </a:ext>
+            </a:extLst>
+          </p:cNvPr>
+          <p:cNvSpPr>
+            <a:spLocks noChangeAspect="1"/>
+          </p:cNvSpPr>
+          <p:nvPr/>
+        </p:nvSpPr>
+        <p:spPr>
+          <a:xfrm>
+            <a:off x="5305780" y="2230562"/>
+            <a:ext cx="265265" cy="220540"/>
+          </a:xfrm>
+          <a:prstGeom prst="ellipse">
+            <a:avLst/>
+          </a:prstGeom>
+        </p:spPr>
+        <p:style>
+          <a:lnRef idx="2">
+            <a:schemeClr val="accent1">
+              <a:shade val="50000"/>
+            </a:schemeClr>
+          </a:lnRef>
+          <a:fillRef idx="1">
+            <a:schemeClr val="accent1"/>
+          </a:fillRef>
+          <a:effectRef idx="0">
+            <a:schemeClr val="accent1"/>
+          </a:effectRef>
+          <a:fontRef idx="minor">
+            <a:schemeClr val="lt1"/>
+          </a:fontRef>
+        </p:style>
+        <p:txBody>
+          <a:bodyPr rtlCol="0" anchor="ctr"/>
+          <a:lstStyle/>
+          <a:p>
+            <a:pPr algn="ctr"/>
+            <a:r>
+              <a:rPr lang="en-US" dirty="0"/>
+              <a:t>T</a:t>
+            </a:r>
+          </a:p>
+        </p:txBody>
+      </p:sp>
+      <p:sp>
+        <p:nvSpPr>
+          <p:cNvPr id="33" name="Oval 32">
+            <a:extLst>
+              <a:ext uri="{FF2B5EF4-FFF2-40B4-BE49-F238E27FC236}">
+                <a16:creationId xmlns:a16="http://schemas.microsoft.com/office/drawing/2014/main" id="{17AD4EA7-59CB-425A-BAAB-EA56A9A9B2DF}"/>
+              </a:ext>
+            </a:extLst>
+          </p:cNvPr>
+          <p:cNvSpPr>
+            <a:spLocks noChangeAspect="1"/>
+          </p:cNvSpPr>
+          <p:nvPr/>
+        </p:nvSpPr>
+        <p:spPr>
+          <a:xfrm>
+            <a:off x="3573434" y="2230562"/>
+            <a:ext cx="265265" cy="220540"/>
+          </a:xfrm>
+          <a:prstGeom prst="ellipse">
+            <a:avLst/>
+          </a:prstGeom>
+        </p:spPr>
+        <p:style>
+          <a:lnRef idx="2">
+            <a:schemeClr val="accent1">
+              <a:shade val="50000"/>
+            </a:schemeClr>
+          </a:lnRef>
+          <a:fillRef idx="1">
+            <a:schemeClr val="accent1"/>
+          </a:fillRef>
+          <a:effectRef idx="0">
+            <a:schemeClr val="accent1"/>
+          </a:effectRef>
+          <a:fontRef idx="minor">
+            <a:schemeClr val="lt1"/>
+          </a:fontRef>
+        </p:style>
+        <p:txBody>
+          <a:bodyPr rtlCol="0" anchor="ctr"/>
+          <a:lstStyle/>
+          <a:p>
+            <a:pPr algn="ctr"/>
+            <a:r>
+              <a:rPr lang="en-US" dirty="0"/>
+              <a:t>T</a:t>
+            </a:r>
+          </a:p>
+        </p:txBody>
+      </p:sp>
+      <p:cxnSp>
+        <p:nvCxnSpPr>
+          <p:cNvPr id="18" name="Straight Connector 17">
+            <a:extLst>
+              <a:ext uri="{FF2B5EF4-FFF2-40B4-BE49-F238E27FC236}">
+                <a16:creationId xmlns:a16="http://schemas.microsoft.com/office/drawing/2014/main" id="{15EC7B01-C95D-446B-86CF-863B18F5AB5B}"/>
+              </a:ext>
+            </a:extLst>
+          </p:cNvPr>
+          <p:cNvCxnSpPr>
+            <a:cxnSpLocks/>
+          </p:cNvCxnSpPr>
+          <p:nvPr/>
+        </p:nvCxnSpPr>
+        <p:spPr>
+          <a:xfrm flipH="1">
+            <a:off x="159595" y="1308102"/>
+            <a:ext cx="8637972" cy="0"/>
+          </a:xfrm>
+          <a:prstGeom prst="line">
+            <a:avLst/>
+          </a:prstGeom>
+        </p:spPr>
+        <p:style>
+          <a:lnRef idx="1">
+            <a:schemeClr val="accent1"/>
+          </a:lnRef>
+          <a:fillRef idx="0">
+            <a:schemeClr val="accent1"/>
+          </a:fillRef>
+          <a:effectRef idx="0">
+            <a:schemeClr val="accent1"/>
+          </a:effectRef>
+          <a:fontRef idx="minor">
+            <a:schemeClr val="tx1"/>
+          </a:fontRef>
+        </p:style>
+      </p:cxnSp>
+      <p:cxnSp>
+        <p:nvCxnSpPr>
+          <p:cNvPr id="20" name="Straight Connector 19">
+            <a:extLst>
+              <a:ext uri="{FF2B5EF4-FFF2-40B4-BE49-F238E27FC236}">
+                <a16:creationId xmlns:a16="http://schemas.microsoft.com/office/drawing/2014/main" id="{80EB5DBF-9C15-40E6-9C65-ABE5FDFD472A}"/>
+              </a:ext>
+            </a:extLst>
+          </p:cNvPr>
+          <p:cNvCxnSpPr>
+            <a:cxnSpLocks/>
+          </p:cNvCxnSpPr>
+          <p:nvPr/>
+        </p:nvCxnSpPr>
+        <p:spPr>
+          <a:xfrm flipH="1">
+            <a:off x="159595" y="1753326"/>
+            <a:ext cx="8637972" cy="0"/>
+          </a:xfrm>
+          <a:prstGeom prst="line">
+            <a:avLst/>
+          </a:prstGeom>
+        </p:spPr>
+        <p:style>
+          <a:lnRef idx="1">
+            <a:schemeClr val="accent1"/>
+          </a:lnRef>
+          <a:fillRef idx="0">
+            <a:schemeClr val="accent1"/>
+          </a:fillRef>
+          <a:effectRef idx="0">
+            <a:schemeClr val="accent1"/>
+          </a:effectRef>
+          <a:fontRef idx="minor">
+            <a:schemeClr val="tx1"/>
+          </a:fontRef>
+        </p:style>
+      </p:cxnSp>
+      <p:cxnSp>
+        <p:nvCxnSpPr>
+          <p:cNvPr id="21" name="Straight Connector 20">
+            <a:extLst>
+              <a:ext uri="{FF2B5EF4-FFF2-40B4-BE49-F238E27FC236}">
+                <a16:creationId xmlns:a16="http://schemas.microsoft.com/office/drawing/2014/main" id="{50C5EE44-85F4-44D0-9DFA-7AE59239EAD0}"/>
+              </a:ext>
+            </a:extLst>
+          </p:cNvPr>
+          <p:cNvCxnSpPr>
+            <a:cxnSpLocks/>
+          </p:cNvCxnSpPr>
+          <p:nvPr/>
+        </p:nvCxnSpPr>
+        <p:spPr>
+          <a:xfrm>
+            <a:off x="5207830" y="1029317"/>
+            <a:ext cx="0" cy="2000821"/>
+          </a:xfrm>
+          <a:prstGeom prst="line">
+            <a:avLst/>
+          </a:prstGeom>
+        </p:spPr>
+        <p:style>
+          <a:lnRef idx="1">
+            <a:schemeClr val="accent1"/>
+          </a:lnRef>
+          <a:fillRef idx="0">
+            <a:schemeClr val="accent1"/>
+          </a:fillRef>
+          <a:effectRef idx="0">
+            <a:schemeClr val="accent1"/>
+          </a:effectRef>
+          <a:fontRef idx="minor">
+            <a:schemeClr val="tx1"/>
+          </a:fontRef>
+        </p:style>
+      </p:cxnSp>
+      <p:cxnSp>
+        <p:nvCxnSpPr>
+          <p:cNvPr id="22" name="Straight Connector 21">
+            <a:extLst>
+              <a:ext uri="{FF2B5EF4-FFF2-40B4-BE49-F238E27FC236}">
+                <a16:creationId xmlns:a16="http://schemas.microsoft.com/office/drawing/2014/main" id="{8FFEA17C-50FF-4426-AE85-F2527EDEBC89}"/>
+              </a:ext>
+            </a:extLst>
+          </p:cNvPr>
+          <p:cNvCxnSpPr>
+            <a:cxnSpLocks/>
+          </p:cNvCxnSpPr>
+          <p:nvPr/>
+        </p:nvCxnSpPr>
+        <p:spPr>
+          <a:xfrm>
+            <a:off x="3909819" y="1048459"/>
+            <a:ext cx="0" cy="2000821"/>
+          </a:xfrm>
+          <a:prstGeom prst="line">
+            <a:avLst/>
+          </a:prstGeom>
+        </p:spPr>
+        <p:style>
+          <a:lnRef idx="1">
+            <a:schemeClr val="accent1"/>
+          </a:lnRef>
+          <a:fillRef idx="0">
+            <a:schemeClr val="accent1"/>
+          </a:fillRef>
+          <a:effectRef idx="0">
+            <a:schemeClr val="accent1"/>
+          </a:effectRef>
+          <a:fontRef idx="minor">
+            <a:schemeClr val="tx1"/>
+          </a:fontRef>
+        </p:style>
+      </p:cxnSp>
+      <p:cxnSp>
+        <p:nvCxnSpPr>
+          <p:cNvPr id="34" name="Straight Connector 33">
+            <a:extLst>
+              <a:ext uri="{FF2B5EF4-FFF2-40B4-BE49-F238E27FC236}">
+                <a16:creationId xmlns:a16="http://schemas.microsoft.com/office/drawing/2014/main" id="{A4971B96-589B-4B65-A9F4-86E72142DC00}"/>
+              </a:ext>
+            </a:extLst>
+          </p:cNvPr>
+          <p:cNvCxnSpPr>
+            <a:cxnSpLocks/>
+          </p:cNvCxnSpPr>
+          <p:nvPr/>
+        </p:nvCxnSpPr>
+        <p:spPr>
+          <a:xfrm flipH="1">
+            <a:off x="159595" y="2218715"/>
+            <a:ext cx="8637972" cy="0"/>
+          </a:xfrm>
+          <a:prstGeom prst="line">
+            <a:avLst/>
+          </a:prstGeom>
+        </p:spPr>
+        <p:style>
+          <a:lnRef idx="1">
+            <a:schemeClr val="accent1"/>
+          </a:lnRef>
+          <a:fillRef idx="0">
+            <a:schemeClr val="accent1"/>
+          </a:fillRef>
+          <a:effectRef idx="0">
+            <a:schemeClr val="accent1"/>
+          </a:effectRef>
+          <a:fontRef idx="minor">
+            <a:schemeClr val="tx1"/>
+          </a:fontRef>
+        </p:style>
+      </p:cxnSp>
+      <p:sp>
+        <p:nvSpPr>
+          <p:cNvPr id="26" name="TextBox 25">
+            <a:extLst>
+              <a:ext uri="{FF2B5EF4-FFF2-40B4-BE49-F238E27FC236}">
+                <a16:creationId xmlns:a16="http://schemas.microsoft.com/office/drawing/2014/main" id="{8A8F4799-27F1-41D6-B3B8-0827BDE3EC72}"/>
+              </a:ext>
+            </a:extLst>
+          </p:cNvPr>
+          <p:cNvSpPr txBox="1"/>
+          <p:nvPr/>
+        </p:nvSpPr>
+        <p:spPr>
+          <a:xfrm>
+            <a:off x="228887" y="319512"/>
+            <a:ext cx="2260042" cy="369332"/>
+          </a:xfrm>
+          <a:prstGeom prst="rect">
+            <a:avLst/>
+          </a:prstGeom>
+          <a:noFill/>
+        </p:spPr>
+        <p:txBody>
+          <a:bodyPr wrap="none" rtlCol="0">
+            <a:spAutoFit/>
+          </a:bodyPr>
+          <a:lstStyle/>
+          <a:p>
+            <a:r>
+              <a:rPr lang="en-US" dirty="0" err="1"/>
+              <a:t>DefaultFor</a:t>
+            </a:r>
+            <a:r>
+              <a:rPr lang="en-US" dirty="0"/>
+              <a:t>=Formation</a:t>
+            </a:r>
+          </a:p>
+        </p:txBody>
+      </p:sp>
+      <p:sp>
+        <p:nvSpPr>
+          <p:cNvPr id="27" name="TextBox 26">
+            <a:extLst>
+              <a:ext uri="{FF2B5EF4-FFF2-40B4-BE49-F238E27FC236}">
+                <a16:creationId xmlns:a16="http://schemas.microsoft.com/office/drawing/2014/main" id="{7E81A3E1-7E69-41E7-B831-7D403BECCAEE}"/>
+              </a:ext>
+            </a:extLst>
+          </p:cNvPr>
+          <p:cNvSpPr txBox="1"/>
+          <p:nvPr/>
+        </p:nvSpPr>
+        <p:spPr>
+          <a:xfrm>
+            <a:off x="212825" y="41964"/>
+            <a:ext cx="2292166" cy="369332"/>
+          </a:xfrm>
+          <a:prstGeom prst="rect">
+            <a:avLst/>
+          </a:prstGeom>
+          <a:noFill/>
+        </p:spPr>
+        <p:txBody>
+          <a:bodyPr wrap="none" rtlCol="0">
+            <a:spAutoFit/>
+          </a:bodyPr>
+          <a:lstStyle/>
+          <a:p>
+            <a:r>
+              <a:rPr lang="en-US" dirty="0" err="1"/>
+              <a:t>TemplateType</a:t>
+            </a:r>
+            <a:r>
+              <a:rPr lang="en-US" dirty="0"/>
+              <a:t>=Default</a:t>
+            </a:r>
+          </a:p>
+        </p:txBody>
+      </p:sp>
+      <p:cxnSp>
+        <p:nvCxnSpPr>
+          <p:cNvPr id="28" name="Straight Connector 27">
+            <a:extLst>
+              <a:ext uri="{FF2B5EF4-FFF2-40B4-BE49-F238E27FC236}">
+                <a16:creationId xmlns:a16="http://schemas.microsoft.com/office/drawing/2014/main" id="{06AAAFFE-740E-4AB6-9B7F-81C6C406FB63}"/>
+              </a:ext>
+            </a:extLst>
+          </p:cNvPr>
+          <p:cNvCxnSpPr/>
+          <p:nvPr/>
+        </p:nvCxnSpPr>
+        <p:spPr>
+          <a:xfrm>
+            <a:off x="1034113" y="1029317"/>
+            <a:ext cx="0" cy="3453413"/>
+          </a:xfrm>
+          <a:prstGeom prst="line">
+            <a:avLst/>
+          </a:prstGeom>
+        </p:spPr>
+        <p:style>
+          <a:lnRef idx="1">
+            <a:schemeClr val="accent1"/>
+          </a:lnRef>
+          <a:fillRef idx="0">
+            <a:schemeClr val="accent1"/>
+          </a:fillRef>
+          <a:effectRef idx="0">
+            <a:schemeClr val="accent1"/>
+          </a:effectRef>
+          <a:fontRef idx="minor">
+            <a:schemeClr val="tx1"/>
+          </a:fontRef>
+        </p:style>
+      </p:cxnSp>
+      <p:cxnSp>
+        <p:nvCxnSpPr>
+          <p:cNvPr id="29" name="Straight Connector 28">
+            <a:extLst>
+              <a:ext uri="{FF2B5EF4-FFF2-40B4-BE49-F238E27FC236}">
+                <a16:creationId xmlns:a16="http://schemas.microsoft.com/office/drawing/2014/main" id="{B93B0CEF-6588-4585-BDC2-FEBBEF8DBA3C}"/>
+              </a:ext>
+            </a:extLst>
+          </p:cNvPr>
+          <p:cNvCxnSpPr/>
+          <p:nvPr/>
+        </p:nvCxnSpPr>
+        <p:spPr>
+          <a:xfrm>
+            <a:off x="8089419" y="1112082"/>
+            <a:ext cx="0" cy="3453413"/>
+          </a:xfrm>
+          <a:prstGeom prst="line">
+            <a:avLst/>
+          </a:prstGeom>
+        </p:spPr>
+        <p:style>
+          <a:lnRef idx="1">
+            <a:schemeClr val="accent1"/>
+          </a:lnRef>
+          <a:fillRef idx="0">
+            <a:schemeClr val="accent1"/>
+          </a:fillRef>
+          <a:effectRef idx="0">
+            <a:schemeClr val="accent1"/>
+          </a:effectRef>
+          <a:fontRef idx="minor">
+            <a:schemeClr val="tx1"/>
+          </a:fontRef>
+        </p:style>
+      </p:cxnSp>
+      <p:cxnSp>
+        <p:nvCxnSpPr>
+          <p:cNvPr id="30" name="Straight Connector 29">
+            <a:extLst>
+              <a:ext uri="{FF2B5EF4-FFF2-40B4-BE49-F238E27FC236}">
+                <a16:creationId xmlns:a16="http://schemas.microsoft.com/office/drawing/2014/main" id="{DAE7B122-E63E-4553-A63E-6B43EC77728D}"/>
+              </a:ext>
+            </a:extLst>
+          </p:cNvPr>
+          <p:cNvCxnSpPr/>
+          <p:nvPr/>
+        </p:nvCxnSpPr>
+        <p:spPr>
+          <a:xfrm>
+            <a:off x="2659516" y="1061128"/>
+            <a:ext cx="0" cy="3453413"/>
+          </a:xfrm>
+          <a:prstGeom prst="line">
+            <a:avLst/>
+          </a:prstGeom>
+        </p:spPr>
+        <p:style>
+          <a:lnRef idx="1">
+            <a:schemeClr val="accent1"/>
+          </a:lnRef>
+          <a:fillRef idx="0">
+            <a:schemeClr val="accent1"/>
+          </a:fillRef>
+          <a:effectRef idx="0">
+            <a:schemeClr val="accent1"/>
+          </a:effectRef>
+          <a:fontRef idx="minor">
+            <a:schemeClr val="tx1"/>
+          </a:fontRef>
+        </p:style>
+      </p:cxnSp>
+      <p:cxnSp>
+        <p:nvCxnSpPr>
+          <p:cNvPr id="35" name="Straight Connector 34">
+            <a:extLst>
+              <a:ext uri="{FF2B5EF4-FFF2-40B4-BE49-F238E27FC236}">
+                <a16:creationId xmlns:a16="http://schemas.microsoft.com/office/drawing/2014/main" id="{DA4CA6BB-FAB2-443C-AE1E-DACB6A26C273}"/>
+              </a:ext>
+            </a:extLst>
+          </p:cNvPr>
+          <p:cNvCxnSpPr/>
+          <p:nvPr/>
+        </p:nvCxnSpPr>
+        <p:spPr>
+          <a:xfrm flipV="1">
+            <a:off x="1847929" y="997505"/>
+            <a:ext cx="0" cy="3517036"/>
+          </a:xfrm>
+          <a:prstGeom prst="line">
+            <a:avLst/>
+          </a:prstGeom>
+          <a:ln>
+            <a:solidFill>
+              <a:srgbClr val="FF0000"/>
+            </a:solidFill>
+          </a:ln>
+        </p:spPr>
+        <p:style>
+          <a:lnRef idx="1">
+            <a:schemeClr val="accent1"/>
+          </a:lnRef>
+          <a:fillRef idx="0">
+            <a:schemeClr val="accent1"/>
+          </a:fillRef>
+          <a:effectRef idx="0">
+            <a:schemeClr val="accent1"/>
+          </a:effectRef>
+          <a:fontRef idx="minor">
+            <a:schemeClr val="tx1"/>
+          </a:fontRef>
+        </p:style>
+      </p:cxnSp>
+      <p:cxnSp>
+        <p:nvCxnSpPr>
+          <p:cNvPr id="36" name="Straight Connector 35">
+            <a:extLst>
+              <a:ext uri="{FF2B5EF4-FFF2-40B4-BE49-F238E27FC236}">
+                <a16:creationId xmlns:a16="http://schemas.microsoft.com/office/drawing/2014/main" id="{332BA220-95AE-4961-ABE6-863A76947433}"/>
+              </a:ext>
+            </a:extLst>
+          </p:cNvPr>
+          <p:cNvCxnSpPr/>
+          <p:nvPr/>
+        </p:nvCxnSpPr>
+        <p:spPr>
+          <a:xfrm flipV="1">
+            <a:off x="7272255" y="1092940"/>
+            <a:ext cx="0" cy="3517036"/>
+          </a:xfrm>
+          <a:prstGeom prst="line">
+            <a:avLst/>
+          </a:prstGeom>
+          <a:ln>
+            <a:solidFill>
+              <a:srgbClr val="FF0000"/>
+            </a:solidFill>
+          </a:ln>
+        </p:spPr>
+        <p:style>
+          <a:lnRef idx="1">
+            <a:schemeClr val="accent1"/>
+          </a:lnRef>
+          <a:fillRef idx="0">
+            <a:schemeClr val="accent1"/>
+          </a:fillRef>
+          <a:effectRef idx="0">
+            <a:schemeClr val="accent1"/>
+          </a:effectRef>
+          <a:fontRef idx="minor">
+            <a:schemeClr val="tx1"/>
+          </a:fontRef>
+        </p:style>
+      </p:cxnSp>
+      <p:cxnSp>
+        <p:nvCxnSpPr>
+          <p:cNvPr id="38" name="Straight Connector 37">
+            <a:extLst>
+              <a:ext uri="{FF2B5EF4-FFF2-40B4-BE49-F238E27FC236}">
+                <a16:creationId xmlns:a16="http://schemas.microsoft.com/office/drawing/2014/main" id="{68E34CE1-6A8A-49BF-B278-D6BD09257B44}"/>
+              </a:ext>
+            </a:extLst>
+          </p:cNvPr>
+          <p:cNvCxnSpPr>
+            <a:cxnSpLocks/>
+          </p:cNvCxnSpPr>
+          <p:nvPr/>
+        </p:nvCxnSpPr>
+        <p:spPr>
+          <a:xfrm flipV="1">
+            <a:off x="6874912" y="1061128"/>
+            <a:ext cx="0" cy="3406099"/>
+          </a:xfrm>
+          <a:prstGeom prst="line">
+            <a:avLst/>
+          </a:prstGeom>
+          <a:ln>
+            <a:solidFill>
+              <a:schemeClr val="accent6">
+                <a:lumMod val="40000"/>
+                <a:lumOff val="60000"/>
+              </a:schemeClr>
+            </a:solidFill>
+          </a:ln>
+        </p:spPr>
+        <p:style>
+          <a:lnRef idx="1">
+            <a:schemeClr val="accent1"/>
+          </a:lnRef>
+          <a:fillRef idx="0">
+            <a:schemeClr val="accent1"/>
+          </a:fillRef>
+          <a:effectRef idx="0">
+            <a:schemeClr val="accent1"/>
+          </a:effectRef>
+          <a:fontRef idx="minor">
+            <a:schemeClr val="tx1"/>
+          </a:fontRef>
+        </p:style>
+      </p:cxnSp>
+      <p:cxnSp>
+        <p:nvCxnSpPr>
+          <p:cNvPr id="40" name="Straight Connector 39">
+            <a:extLst>
+              <a:ext uri="{FF2B5EF4-FFF2-40B4-BE49-F238E27FC236}">
+                <a16:creationId xmlns:a16="http://schemas.microsoft.com/office/drawing/2014/main" id="{8CB51C8B-79F9-484D-A8B7-69D90044D6CF}"/>
+              </a:ext>
+            </a:extLst>
+          </p:cNvPr>
+          <p:cNvCxnSpPr/>
+          <p:nvPr/>
+        </p:nvCxnSpPr>
+        <p:spPr>
+          <a:xfrm flipV="1">
+            <a:off x="4560092" y="1048459"/>
+            <a:ext cx="0" cy="3517036"/>
+          </a:xfrm>
+          <a:prstGeom prst="line">
+            <a:avLst/>
+          </a:prstGeom>
+          <a:ln>
+            <a:solidFill>
+              <a:srgbClr val="FF0000"/>
+            </a:solidFill>
+          </a:ln>
+        </p:spPr>
+        <p:style>
+          <a:lnRef idx="1">
+            <a:schemeClr val="accent1"/>
+          </a:lnRef>
+          <a:fillRef idx="0">
+            <a:schemeClr val="accent1"/>
+          </a:fillRef>
+          <a:effectRef idx="0">
+            <a:schemeClr val="accent1"/>
+          </a:effectRef>
+          <a:fontRef idx="minor">
+            <a:schemeClr val="tx1"/>
+          </a:fontRef>
+        </p:style>
+      </p:cxnSp>
+      <p:cxnSp>
+        <p:nvCxnSpPr>
+          <p:cNvPr id="42" name="Straight Connector 41">
+            <a:extLst>
+              <a:ext uri="{FF2B5EF4-FFF2-40B4-BE49-F238E27FC236}">
+                <a16:creationId xmlns:a16="http://schemas.microsoft.com/office/drawing/2014/main" id="{FD7F9123-C99E-4172-A619-507E5C0438DC}"/>
+              </a:ext>
+            </a:extLst>
+          </p:cNvPr>
+          <p:cNvCxnSpPr/>
+          <p:nvPr/>
+        </p:nvCxnSpPr>
+        <p:spPr>
+          <a:xfrm>
+            <a:off x="6472576" y="1092940"/>
+            <a:ext cx="0" cy="3453413"/>
+          </a:xfrm>
+          <a:prstGeom prst="line">
+            <a:avLst/>
+          </a:prstGeom>
+        </p:spPr>
+        <p:style>
+          <a:lnRef idx="1">
+            <a:schemeClr val="accent1"/>
+          </a:lnRef>
+          <a:fillRef idx="0">
+            <a:schemeClr val="accent1"/>
+          </a:fillRef>
+          <a:effectRef idx="0">
+            <a:schemeClr val="accent1"/>
+          </a:effectRef>
+          <a:fontRef idx="minor">
+            <a:schemeClr val="tx1"/>
+          </a:fontRef>
+        </p:style>
+      </p:cxnSp>
+      <p:cxnSp>
+        <p:nvCxnSpPr>
+          <p:cNvPr id="48" name="Straight Connector 47">
+            <a:extLst>
+              <a:ext uri="{FF2B5EF4-FFF2-40B4-BE49-F238E27FC236}">
+                <a16:creationId xmlns:a16="http://schemas.microsoft.com/office/drawing/2014/main" id="{BFD7D10F-A8EA-41FD-88C4-92C39D087C54}"/>
+              </a:ext>
+            </a:extLst>
+          </p:cNvPr>
+          <p:cNvCxnSpPr>
+            <a:cxnSpLocks/>
+          </p:cNvCxnSpPr>
+          <p:nvPr/>
+        </p:nvCxnSpPr>
+        <p:spPr>
+          <a:xfrm flipV="1">
+            <a:off x="7674591" y="1103927"/>
+            <a:ext cx="0" cy="3406099"/>
+          </a:xfrm>
+          <a:prstGeom prst="line">
+            <a:avLst/>
+          </a:prstGeom>
+          <a:ln>
+            <a:solidFill>
+              <a:schemeClr val="accent6">
+                <a:lumMod val="40000"/>
+                <a:lumOff val="60000"/>
+              </a:schemeClr>
+            </a:solidFill>
+          </a:ln>
+        </p:spPr>
+        <p:style>
+          <a:lnRef idx="1">
+            <a:schemeClr val="accent1"/>
+          </a:lnRef>
+          <a:fillRef idx="0">
+            <a:schemeClr val="accent1"/>
+          </a:fillRef>
+          <a:effectRef idx="0">
+            <a:schemeClr val="accent1"/>
+          </a:effectRef>
+          <a:fontRef idx="minor">
+            <a:schemeClr val="tx1"/>
+          </a:fontRef>
+        </p:style>
+      </p:cxnSp>
+      <p:cxnSp>
+        <p:nvCxnSpPr>
+          <p:cNvPr id="51" name="Straight Connector 50">
+            <a:extLst>
+              <a:ext uri="{FF2B5EF4-FFF2-40B4-BE49-F238E27FC236}">
+                <a16:creationId xmlns:a16="http://schemas.microsoft.com/office/drawing/2014/main" id="{59A45149-3490-4857-B5E8-0AF9D7FDC51F}"/>
+              </a:ext>
+            </a:extLst>
+          </p:cNvPr>
+          <p:cNvCxnSpPr>
+            <a:cxnSpLocks/>
+          </p:cNvCxnSpPr>
+          <p:nvPr/>
+        </p:nvCxnSpPr>
+        <p:spPr>
+          <a:xfrm flipV="1">
+            <a:off x="2257180" y="997505"/>
+            <a:ext cx="0" cy="3406099"/>
+          </a:xfrm>
+          <a:prstGeom prst="line">
+            <a:avLst/>
+          </a:prstGeom>
+          <a:ln>
+            <a:solidFill>
+              <a:schemeClr val="accent6">
+                <a:lumMod val="40000"/>
+                <a:lumOff val="60000"/>
+              </a:schemeClr>
+            </a:solidFill>
+          </a:ln>
+        </p:spPr>
+        <p:style>
+          <a:lnRef idx="1">
+            <a:schemeClr val="accent1"/>
+          </a:lnRef>
+          <a:fillRef idx="0">
+            <a:schemeClr val="accent1"/>
+          </a:fillRef>
+          <a:effectRef idx="0">
+            <a:schemeClr val="accent1"/>
+          </a:effectRef>
+          <a:fontRef idx="minor">
+            <a:schemeClr val="tx1"/>
+          </a:fontRef>
+        </p:style>
+      </p:cxnSp>
+      <p:cxnSp>
+        <p:nvCxnSpPr>
+          <p:cNvPr id="52" name="Straight Connector 51">
+            <a:extLst>
+              <a:ext uri="{FF2B5EF4-FFF2-40B4-BE49-F238E27FC236}">
+                <a16:creationId xmlns:a16="http://schemas.microsoft.com/office/drawing/2014/main" id="{F9FE7BB8-0366-43F8-868B-2AF1ADDC1F59}"/>
+              </a:ext>
+            </a:extLst>
+          </p:cNvPr>
+          <p:cNvCxnSpPr>
+            <a:cxnSpLocks/>
+          </p:cNvCxnSpPr>
+          <p:nvPr/>
+        </p:nvCxnSpPr>
+        <p:spPr>
+          <a:xfrm flipV="1">
+            <a:off x="1445593" y="997504"/>
+            <a:ext cx="0" cy="3406099"/>
+          </a:xfrm>
+          <a:prstGeom prst="line">
+            <a:avLst/>
+          </a:prstGeom>
+          <a:ln>
+            <a:solidFill>
+              <a:schemeClr val="accent6">
+                <a:lumMod val="40000"/>
+                <a:lumOff val="60000"/>
+              </a:schemeClr>
+            </a:solidFill>
+          </a:ln>
+        </p:spPr>
+        <p:style>
+          <a:lnRef idx="1">
+            <a:schemeClr val="accent1"/>
+          </a:lnRef>
+          <a:fillRef idx="0">
+            <a:schemeClr val="accent1"/>
+          </a:fillRef>
+          <a:effectRef idx="0">
+            <a:schemeClr val="accent1"/>
+          </a:effectRef>
+          <a:fontRef idx="minor">
+            <a:schemeClr val="tx1"/>
+          </a:fontRef>
+        </p:style>
+      </p:cxnSp>
+      <p:sp>
+        <p:nvSpPr>
+          <p:cNvPr id="12" name="Oval 11">
+            <a:extLst>
+              <a:ext uri="{FF2B5EF4-FFF2-40B4-BE49-F238E27FC236}">
+                <a16:creationId xmlns:a16="http://schemas.microsoft.com/office/drawing/2014/main" id="{E7AE84CA-4D4F-430A-8819-4CCA5ACB9A15}"/>
+              </a:ext>
+            </a:extLst>
+          </p:cNvPr>
+          <p:cNvSpPr>
+            <a:spLocks noChangeAspect="1"/>
+          </p:cNvSpPr>
+          <p:nvPr/>
+        </p:nvSpPr>
+        <p:spPr>
+          <a:xfrm>
+            <a:off x="1718547" y="1992180"/>
+            <a:ext cx="265265" cy="220540"/>
+          </a:xfrm>
+          <a:prstGeom prst="ellipse">
+            <a:avLst/>
+          </a:prstGeom>
+        </p:spPr>
+        <p:style>
+          <a:lnRef idx="2">
+            <a:schemeClr val="dk1"/>
+          </a:lnRef>
+          <a:fillRef idx="1">
+            <a:schemeClr val="lt1"/>
+          </a:fillRef>
+          <a:effectRef idx="0">
+            <a:schemeClr val="dk1"/>
+          </a:effectRef>
+          <a:fontRef idx="minor">
+            <a:schemeClr val="dk1"/>
+          </a:fontRef>
+        </p:style>
+        <p:txBody>
+          <a:bodyPr rtlCol="0" anchor="ctr"/>
+          <a:lstStyle/>
+          <a:p>
+            <a:pPr algn="ctr"/>
+            <a:r>
+              <a:rPr lang="en-US" dirty="0"/>
+              <a:t>B</a:t>
+            </a:r>
+          </a:p>
+        </p:txBody>
+      </p:sp>
+      <p:sp>
+        <p:nvSpPr>
+          <p:cNvPr id="16" name="Oval 15">
+            <a:extLst>
+              <a:ext uri="{FF2B5EF4-FFF2-40B4-BE49-F238E27FC236}">
+                <a16:creationId xmlns:a16="http://schemas.microsoft.com/office/drawing/2014/main" id="{5841B79C-4E4D-468A-8183-5EAAD5603C0D}"/>
+              </a:ext>
+            </a:extLst>
+          </p:cNvPr>
+          <p:cNvSpPr>
+            <a:spLocks noChangeAspect="1"/>
+          </p:cNvSpPr>
+          <p:nvPr/>
+        </p:nvSpPr>
+        <p:spPr>
+          <a:xfrm>
+            <a:off x="904379" y="1998175"/>
+            <a:ext cx="265265" cy="220540"/>
+          </a:xfrm>
+          <a:prstGeom prst="ellipse">
+            <a:avLst/>
+          </a:prstGeom>
+        </p:spPr>
+        <p:style>
+          <a:lnRef idx="2">
+            <a:schemeClr val="dk1"/>
+          </a:lnRef>
+          <a:fillRef idx="1">
+            <a:schemeClr val="lt1"/>
+          </a:fillRef>
+          <a:effectRef idx="0">
+            <a:schemeClr val="dk1"/>
+          </a:effectRef>
+          <a:fontRef idx="minor">
+            <a:schemeClr val="dk1"/>
+          </a:fontRef>
+        </p:style>
+        <p:txBody>
+          <a:bodyPr rtlCol="0" anchor="ctr"/>
+          <a:lstStyle/>
+          <a:p>
+            <a:pPr algn="ctr"/>
+            <a:r>
+              <a:rPr lang="en-US" dirty="0"/>
+              <a:t>Z</a:t>
+            </a:r>
+          </a:p>
+        </p:txBody>
+      </p:sp>
+      <p:sp>
+        <p:nvSpPr>
+          <p:cNvPr id="24" name="Oval 23">
+            <a:extLst>
+              <a:ext uri="{FF2B5EF4-FFF2-40B4-BE49-F238E27FC236}">
+                <a16:creationId xmlns:a16="http://schemas.microsoft.com/office/drawing/2014/main" id="{B889BA8C-0E26-4F3F-8CF7-B18F6ADC2A52}"/>
+              </a:ext>
+            </a:extLst>
+          </p:cNvPr>
+          <p:cNvSpPr>
+            <a:spLocks noChangeAspect="1"/>
+          </p:cNvSpPr>
+          <p:nvPr/>
+        </p:nvSpPr>
+        <p:spPr>
+          <a:xfrm>
+            <a:off x="4428462" y="1647066"/>
+            <a:ext cx="265265" cy="220540"/>
+          </a:xfrm>
+          <a:prstGeom prst="ellipse">
+            <a:avLst/>
+          </a:prstGeom>
+        </p:spPr>
+        <p:style>
+          <a:lnRef idx="2">
+            <a:schemeClr val="dk1"/>
+          </a:lnRef>
+          <a:fillRef idx="1">
+            <a:schemeClr val="lt1"/>
+          </a:fillRef>
+          <a:effectRef idx="0">
+            <a:schemeClr val="dk1"/>
+          </a:effectRef>
+          <a:fontRef idx="minor">
+            <a:schemeClr val="dk1"/>
+          </a:fontRef>
+        </p:style>
+        <p:txBody>
+          <a:bodyPr rtlCol="0" anchor="ctr"/>
+          <a:lstStyle/>
+          <a:p>
+            <a:pPr algn="ctr"/>
+            <a:r>
+              <a:rPr lang="en-US" dirty="0"/>
+              <a:t>Q</a:t>
+            </a:r>
+          </a:p>
+        </p:txBody>
+      </p:sp>
+      <p:sp>
+        <p:nvSpPr>
+          <p:cNvPr id="13" name="Oval 12">
+            <a:extLst>
+              <a:ext uri="{FF2B5EF4-FFF2-40B4-BE49-F238E27FC236}">
+                <a16:creationId xmlns:a16="http://schemas.microsoft.com/office/drawing/2014/main" id="{AE4A4AEA-DF68-49EC-AF15-FAAFC1CF9583}"/>
+              </a:ext>
+            </a:extLst>
+          </p:cNvPr>
+          <p:cNvSpPr>
+            <a:spLocks noChangeAspect="1"/>
+          </p:cNvSpPr>
+          <p:nvPr/>
+        </p:nvSpPr>
+        <p:spPr>
+          <a:xfrm>
+            <a:off x="5079266" y="1647066"/>
+            <a:ext cx="265265" cy="220540"/>
+          </a:xfrm>
+          <a:prstGeom prst="ellipse">
+            <a:avLst/>
+          </a:prstGeom>
+        </p:spPr>
+        <p:style>
+          <a:lnRef idx="2">
+            <a:schemeClr val="dk1"/>
+          </a:lnRef>
+          <a:fillRef idx="1">
+            <a:schemeClr val="lt1"/>
+          </a:fillRef>
+          <a:effectRef idx="0">
+            <a:schemeClr val="dk1"/>
+          </a:effectRef>
+          <a:fontRef idx="minor">
+            <a:schemeClr val="dk1"/>
+          </a:fontRef>
+        </p:style>
+        <p:txBody>
+          <a:bodyPr rtlCol="0" anchor="ctr"/>
+          <a:lstStyle/>
+          <a:p>
+            <a:pPr algn="ctr"/>
+            <a:r>
+              <a:rPr lang="en-US" dirty="0"/>
+              <a:t>A</a:t>
+            </a:r>
+          </a:p>
+        </p:txBody>
+      </p:sp>
+      <p:sp>
+        <p:nvSpPr>
+          <p:cNvPr id="14" name="Oval 13">
+            <a:extLst>
+              <a:ext uri="{FF2B5EF4-FFF2-40B4-BE49-F238E27FC236}">
+                <a16:creationId xmlns:a16="http://schemas.microsoft.com/office/drawing/2014/main" id="{A2696784-3498-4ED5-8634-F87CAD88217F}"/>
+              </a:ext>
+            </a:extLst>
+          </p:cNvPr>
+          <p:cNvSpPr>
+            <a:spLocks noChangeAspect="1"/>
+          </p:cNvSpPr>
+          <p:nvPr/>
+        </p:nvSpPr>
+        <p:spPr>
+          <a:xfrm>
+            <a:off x="7969096" y="2236912"/>
+            <a:ext cx="265265" cy="220540"/>
+          </a:xfrm>
+          <a:prstGeom prst="ellipse">
+            <a:avLst/>
+          </a:prstGeom>
+        </p:spPr>
+        <p:style>
+          <a:lnRef idx="2">
+            <a:schemeClr val="dk1"/>
+          </a:lnRef>
+          <a:fillRef idx="1">
+            <a:schemeClr val="lt1"/>
+          </a:fillRef>
+          <a:effectRef idx="0">
+            <a:schemeClr val="dk1"/>
+          </a:effectRef>
+          <a:fontRef idx="minor">
+            <a:schemeClr val="dk1"/>
+          </a:fontRef>
+        </p:style>
+        <p:txBody>
+          <a:bodyPr rtlCol="0" anchor="ctr"/>
+          <a:lstStyle/>
+          <a:p>
+            <a:pPr algn="ctr"/>
+            <a:r>
+              <a:rPr lang="en-US" dirty="0"/>
+              <a:t>X</a:t>
+            </a:r>
+          </a:p>
+        </p:txBody>
+      </p:sp>
+      <p:sp>
+        <p:nvSpPr>
+          <p:cNvPr id="15" name="Oval 14">
+            <a:extLst>
+              <a:ext uri="{FF2B5EF4-FFF2-40B4-BE49-F238E27FC236}">
+                <a16:creationId xmlns:a16="http://schemas.microsoft.com/office/drawing/2014/main" id="{853CF83B-23FA-4FDD-B630-534284876844}"/>
+              </a:ext>
+            </a:extLst>
+          </p:cNvPr>
+          <p:cNvSpPr>
+            <a:spLocks noChangeAspect="1"/>
+          </p:cNvSpPr>
+          <p:nvPr/>
+        </p:nvSpPr>
+        <p:spPr>
+          <a:xfrm>
+            <a:off x="3147936" y="2226116"/>
+            <a:ext cx="265265" cy="220540"/>
+          </a:xfrm>
+          <a:prstGeom prst="ellipse">
+            <a:avLst/>
+          </a:prstGeom>
+        </p:spPr>
+        <p:style>
+          <a:lnRef idx="2">
+            <a:schemeClr val="dk1"/>
+          </a:lnRef>
+          <a:fillRef idx="1">
+            <a:schemeClr val="lt1"/>
+          </a:fillRef>
+          <a:effectRef idx="0">
+            <a:schemeClr val="dk1"/>
+          </a:effectRef>
+          <a:fontRef idx="minor">
+            <a:schemeClr val="dk1"/>
+          </a:fontRef>
+        </p:style>
+        <p:txBody>
+          <a:bodyPr rtlCol="0" anchor="ctr"/>
+          <a:lstStyle/>
+          <a:p>
+            <a:pPr algn="ctr"/>
+            <a:r>
+              <a:rPr lang="en-US" dirty="0"/>
+              <a:t>Y</a:t>
+            </a:r>
+          </a:p>
+        </p:txBody>
+      </p:sp>
+    </p:spTree>
+    <p:extLst>
+      <p:ext uri="{BB962C8B-B14F-4D97-AF65-F5344CB8AC3E}">
+        <p14:creationId xmlns:p14="http://schemas.microsoft.com/office/powerpoint/2010/main" val="1687153507"/>
+      </p:ext>
+    </p:extLst>
+  </p:cSld>
+  <p:clrMapOvr>
+    <a:masterClrMapping/>
+  </p:clrMapOvr>
+</p:sld>
+</file>
+
+<file path=ppt/slides/slide4.xml><?xml version="1.0" encoding="utf-8"?>
+<p:sld xmlns:a="http://schemas.openxmlformats.org/drawingml/2006/main" xmlns:r="http://schemas.openxmlformats.org/officeDocument/2006/relationships" xmlns:p="http://schemas.openxmlformats.org/presentationml/2006/main">
+  <p:cSld>
+    <p:spTree>
+      <p:nvGrpSpPr>
+        <p:cNvPr id="1" name=""/>
+        <p:cNvGrpSpPr/>
+        <p:nvPr/>
+      </p:nvGrpSpPr>
+      <p:grpSpPr>
+        <a:xfrm>
+          <a:off x="0" y="0"/>
+          <a:ext cx="0" cy="0"/>
+          <a:chOff x="0" y="0"/>
+          <a:chExt cx="0" cy="0"/>
+        </a:xfrm>
+      </p:grpSpPr>
       <p:pic>
         <p:nvPicPr>
           <p:cNvPr id="4" name="Picture 3">
@@ -5550,7 +6968,7 @@
 </p:sld>
 </file>
 
-<file path=ppt/slides/slide3.xml><?xml version="1.0" encoding="utf-8"?>
+<file path=ppt/slides/slide5.xml><?xml version="1.0" encoding="utf-8"?>
 <p:sld xmlns:a="http://schemas.openxmlformats.org/drawingml/2006/main" xmlns:r="http://schemas.openxmlformats.org/officeDocument/2006/relationships" xmlns:p="http://schemas.openxmlformats.org/presentationml/2006/main">
   <p:cSld>
     <p:spTree>

</xml_diff>